<commit_message>
fixed most corrections... remaining: Figure 1: Trade-off error/discrepancy vs. overhead due to local learning and update ---one pillar Figure 2: Trade-off accuracy vs. overhead due to ensemble learning for analytics --another pillar.
</commit_message>
<xml_diff>
--- a/Dissertation/MastersVideo.pptx
+++ b/Dissertation/MastersVideo.pptx
@@ -36,14 +36,14 @@
   <p:notesSz cx="6858000" cy="9144000"/>
   <p:embeddedFontLst>
     <p:embeddedFont>
-      <p:font typeface="Calibri" panose="020F0502020204030204" pitchFamily="34" charset="0"/>
-      <p:regular r:id="rId26"/>
-      <p:bold r:id="rId27"/>
-      <p:italic r:id="rId28"/>
-      <p:boldItalic r:id="rId29"/>
+      <p:font typeface="Merriweather Sans" panose="020B0604020202020204" charset="0"/>
+      <p:italic r:id="rId26"/>
+      <p:boldItalic r:id="rId27"/>
     </p:embeddedFont>
     <p:embeddedFont>
-      <p:font typeface="Merriweather Sans" panose="020B0604020202020204" charset="0"/>
+      <p:font typeface="Calibri" panose="020F0502020204030204" pitchFamily="34" charset="0"/>
+      <p:regular r:id="rId28"/>
+      <p:bold r:id="rId29"/>
       <p:italic r:id="rId30"/>
       <p:boldItalic r:id="rId31"/>
     </p:embeddedFont>
@@ -1274,10 +1274,24 @@
     <dgm:pt modelId="{91832786-EA52-46D3-BC5B-A0FBD057173B}" type="pres">
       <dgm:prSet presAssocID="{F6EB8A53-3F62-41D0-A014-1354D9554EF2}" presName="sibTrans" presStyleLbl="sibTrans2D1" presStyleIdx="0" presStyleCnt="5"/>
       <dgm:spPr/>
+      <dgm:t>
+        <a:bodyPr/>
+        <a:lstStyle/>
+        <a:p>
+          <a:endParaRPr lang="en-GB"/>
+        </a:p>
+      </dgm:t>
     </dgm:pt>
     <dgm:pt modelId="{8A3D1502-D727-4AC9-A0D2-98FA0BA08BF8}" type="pres">
       <dgm:prSet presAssocID="{F6EB8A53-3F62-41D0-A014-1354D9554EF2}" presName="connectorText" presStyleLbl="sibTrans2D1" presStyleIdx="0" presStyleCnt="5"/>
       <dgm:spPr/>
+      <dgm:t>
+        <a:bodyPr/>
+        <a:lstStyle/>
+        <a:p>
+          <a:endParaRPr lang="en-GB"/>
+        </a:p>
+      </dgm:t>
     </dgm:pt>
     <dgm:pt modelId="{CD0C461B-B960-48F1-A426-478C15103275}" type="pres">
       <dgm:prSet presAssocID="{BB46D246-7BEE-4141-BF8D-B978CE59DD4E}" presName="node" presStyleLbl="node1" presStyleIdx="1" presStyleCnt="6">
@@ -1297,10 +1311,24 @@
     <dgm:pt modelId="{EE3459AF-3F61-4283-8423-8E59FB6E0915}" type="pres">
       <dgm:prSet presAssocID="{36C904E1-3945-435E-ABF0-AE499A249B05}" presName="sibTrans" presStyleLbl="sibTrans2D1" presStyleIdx="1" presStyleCnt="5"/>
       <dgm:spPr/>
+      <dgm:t>
+        <a:bodyPr/>
+        <a:lstStyle/>
+        <a:p>
+          <a:endParaRPr lang="en-GB"/>
+        </a:p>
+      </dgm:t>
     </dgm:pt>
     <dgm:pt modelId="{C81FB04D-E1A3-460D-A088-01087A41C9BC}" type="pres">
       <dgm:prSet presAssocID="{36C904E1-3945-435E-ABF0-AE499A249B05}" presName="connectorText" presStyleLbl="sibTrans2D1" presStyleIdx="1" presStyleCnt="5"/>
       <dgm:spPr/>
+      <dgm:t>
+        <a:bodyPr/>
+        <a:lstStyle/>
+        <a:p>
+          <a:endParaRPr lang="en-GB"/>
+        </a:p>
+      </dgm:t>
     </dgm:pt>
     <dgm:pt modelId="{79B80FA3-2877-421E-AF48-A7B17B7C830D}" type="pres">
       <dgm:prSet presAssocID="{56A4048E-E9F3-40B8-9789-5CA2E64CC322}" presName="node" presStyleLbl="node1" presStyleIdx="2" presStyleCnt="6">
@@ -1309,14 +1337,35 @@
         </dgm:presLayoutVars>
       </dgm:prSet>
       <dgm:spPr/>
+      <dgm:t>
+        <a:bodyPr/>
+        <a:lstStyle/>
+        <a:p>
+          <a:endParaRPr lang="en-GB"/>
+        </a:p>
+      </dgm:t>
     </dgm:pt>
     <dgm:pt modelId="{E3396C51-DEDD-4270-9473-8223584EA728}" type="pres">
       <dgm:prSet presAssocID="{6E950189-3479-4639-820D-BA83D05B1111}" presName="sibTrans" presStyleLbl="sibTrans2D1" presStyleIdx="2" presStyleCnt="5"/>
       <dgm:spPr/>
+      <dgm:t>
+        <a:bodyPr/>
+        <a:lstStyle/>
+        <a:p>
+          <a:endParaRPr lang="en-GB"/>
+        </a:p>
+      </dgm:t>
     </dgm:pt>
     <dgm:pt modelId="{FBD5F1DB-412F-48DC-9EA3-7D84A83022BE}" type="pres">
       <dgm:prSet presAssocID="{6E950189-3479-4639-820D-BA83D05B1111}" presName="connectorText" presStyleLbl="sibTrans2D1" presStyleIdx="2" presStyleCnt="5"/>
       <dgm:spPr/>
+      <dgm:t>
+        <a:bodyPr/>
+        <a:lstStyle/>
+        <a:p>
+          <a:endParaRPr lang="en-GB"/>
+        </a:p>
+      </dgm:t>
     </dgm:pt>
     <dgm:pt modelId="{300C7EFA-DB50-46A3-85CA-A52D2DA0AD63}" type="pres">
       <dgm:prSet presAssocID="{CD4FAD1E-9CD8-434F-A636-CA188905A8F3}" presName="node" presStyleLbl="node1" presStyleIdx="3" presStyleCnt="6">
@@ -1325,14 +1374,35 @@
         </dgm:presLayoutVars>
       </dgm:prSet>
       <dgm:spPr/>
+      <dgm:t>
+        <a:bodyPr/>
+        <a:lstStyle/>
+        <a:p>
+          <a:endParaRPr lang="en-GB"/>
+        </a:p>
+      </dgm:t>
     </dgm:pt>
     <dgm:pt modelId="{BDEBCC3E-69F8-492D-BC96-4F68310DD2AB}" type="pres">
       <dgm:prSet presAssocID="{6A267BD7-CEC6-4F03-849C-6AC44D21688C}" presName="sibTrans" presStyleLbl="sibTrans2D1" presStyleIdx="3" presStyleCnt="5"/>
       <dgm:spPr/>
+      <dgm:t>
+        <a:bodyPr/>
+        <a:lstStyle/>
+        <a:p>
+          <a:endParaRPr lang="en-GB"/>
+        </a:p>
+      </dgm:t>
     </dgm:pt>
     <dgm:pt modelId="{81EED833-C2B3-4AE5-89D5-34FA9E32CF52}" type="pres">
       <dgm:prSet presAssocID="{6A267BD7-CEC6-4F03-849C-6AC44D21688C}" presName="connectorText" presStyleLbl="sibTrans2D1" presStyleIdx="3" presStyleCnt="5"/>
       <dgm:spPr/>
+      <dgm:t>
+        <a:bodyPr/>
+        <a:lstStyle/>
+        <a:p>
+          <a:endParaRPr lang="en-GB"/>
+        </a:p>
+      </dgm:t>
     </dgm:pt>
     <dgm:pt modelId="{373BEE32-54FB-4765-B6E1-8F13065A97E8}" type="pres">
       <dgm:prSet presAssocID="{3E2B6BC6-2A7A-4CFD-8AAC-58DDC9F6F0E2}" presName="node" presStyleLbl="node1" presStyleIdx="4" presStyleCnt="6">
@@ -1352,10 +1422,24 @@
     <dgm:pt modelId="{8A9BA424-2887-4F2A-8052-A424B61DA147}" type="pres">
       <dgm:prSet presAssocID="{8D2C8301-07A2-48E4-A23E-0F5778BBA35D}" presName="sibTrans" presStyleLbl="sibTrans2D1" presStyleIdx="4" presStyleCnt="5" custScaleX="164069" custScaleY="164069"/>
       <dgm:spPr/>
+      <dgm:t>
+        <a:bodyPr/>
+        <a:lstStyle/>
+        <a:p>
+          <a:endParaRPr lang="en-GB"/>
+        </a:p>
+      </dgm:t>
     </dgm:pt>
     <dgm:pt modelId="{E13D610C-4519-4338-8494-E4B8F4A470B0}" type="pres">
       <dgm:prSet presAssocID="{8D2C8301-07A2-48E4-A23E-0F5778BBA35D}" presName="connectorText" presStyleLbl="sibTrans2D1" presStyleIdx="4" presStyleCnt="5"/>
       <dgm:spPr/>
+      <dgm:t>
+        <a:bodyPr/>
+        <a:lstStyle/>
+        <a:p>
+          <a:endParaRPr lang="en-GB"/>
+        </a:p>
+      </dgm:t>
     </dgm:pt>
     <dgm:pt modelId="{598FE30E-1CA9-4F9D-88E4-779C297834DE}" type="pres">
       <dgm:prSet presAssocID="{93B728C6-E62F-43D9-8709-6A6DE0C947D9}" presName="node" presStyleLbl="node1" presStyleIdx="5" presStyleCnt="6">
@@ -1379,8 +1463,8 @@
     <dgm:cxn modelId="{F7DBAAEF-42AF-4482-9A53-D57E65761F98}" srcId="{A16CA583-E7BD-4834-A6BC-8047046B5A90}" destId="{56A4048E-E9F3-40B8-9789-5CA2E64CC322}" srcOrd="2" destOrd="0" parTransId="{E1A7B1BA-7182-4BA9-97E8-FA537BAC26DC}" sibTransId="{6E950189-3479-4639-820D-BA83D05B1111}"/>
     <dgm:cxn modelId="{93CD711A-6BCA-45F9-8778-04FFF680B5A9}" srcId="{A16CA583-E7BD-4834-A6BC-8047046B5A90}" destId="{995F6F3B-4082-4661-94BB-1B7E80E32361}" srcOrd="0" destOrd="0" parTransId="{A012C31C-2E06-4B66-A962-9A9B9B659794}" sibTransId="{F6EB8A53-3F62-41D0-A014-1354D9554EF2}"/>
     <dgm:cxn modelId="{E6425B00-F091-4ABC-8F53-E5C7B223C1CE}" srcId="{A16CA583-E7BD-4834-A6BC-8047046B5A90}" destId="{3E2B6BC6-2A7A-4CFD-8AAC-58DDC9F6F0E2}" srcOrd="4" destOrd="0" parTransId="{D8E9F289-8B2E-4A69-9E62-2E74FC67BA1D}" sibTransId="{8D2C8301-07A2-48E4-A23E-0F5778BBA35D}"/>
+    <dgm:cxn modelId="{7CA71318-0420-49CB-9BFC-963045BA0E88}" type="presOf" srcId="{6A267BD7-CEC6-4F03-849C-6AC44D21688C}" destId="{BDEBCC3E-69F8-492D-BC96-4F68310DD2AB}" srcOrd="0" destOrd="0" presId="urn:microsoft.com/office/officeart/2005/8/layout/process1"/>
     <dgm:cxn modelId="{CEA85CDC-DF51-4AC2-8804-D7A67B36752E}" type="presOf" srcId="{F6EB8A53-3F62-41D0-A014-1354D9554EF2}" destId="{91832786-EA52-46D3-BC5B-A0FBD057173B}" srcOrd="0" destOrd="0" presId="urn:microsoft.com/office/officeart/2005/8/layout/process1"/>
-    <dgm:cxn modelId="{7CA71318-0420-49CB-9BFC-963045BA0E88}" type="presOf" srcId="{6A267BD7-CEC6-4F03-849C-6AC44D21688C}" destId="{BDEBCC3E-69F8-492D-BC96-4F68310DD2AB}" srcOrd="0" destOrd="0" presId="urn:microsoft.com/office/officeart/2005/8/layout/process1"/>
     <dgm:cxn modelId="{9FED9AA6-4095-45BA-A360-CBFF5954CA88}" srcId="{A16CA583-E7BD-4834-A6BC-8047046B5A90}" destId="{93B728C6-E62F-43D9-8709-6A6DE0C947D9}" srcOrd="5" destOrd="0" parTransId="{3D5BB524-6817-4B0D-AB9B-55CDA9C5D704}" sibTransId="{ECC5A904-9127-4932-A638-085E5ECDD8DA}"/>
     <dgm:cxn modelId="{E81BE61A-1FAC-4719-B616-5EE225613D5F}" type="presOf" srcId="{56A4048E-E9F3-40B8-9789-5CA2E64CC322}" destId="{79B80FA3-2877-421E-AF48-A7B17B7C830D}" srcOrd="0" destOrd="0" presId="urn:microsoft.com/office/officeart/2005/8/layout/process1"/>
     <dgm:cxn modelId="{02948357-2E0F-4CF2-8EE4-8237244FBC84}" type="presOf" srcId="{93B728C6-E62F-43D9-8709-6A6DE0C947D9}" destId="{598FE30E-1CA9-4F9D-88E4-779C297834DE}" srcOrd="0" destOrd="0" presId="urn:microsoft.com/office/officeart/2005/8/layout/process1"/>
@@ -3818,11 +3902,11 @@
 </file>
 
 <file path=ppt/notesSlides/notesSlide10.xml><?xml version="1.0" encoding="utf-8"?>
-<p:notes xmlns:a="http://schemas.openxmlformats.org/drawingml/2006/main" xmlns:r="http://schemas.openxmlformats.org/officeDocument/2006/relationships" xmlns:p="http://schemas.openxmlformats.org/presentationml/2006/main" showMasterSp="0" showMasterPhAnim="0">
+<p:notes xmlns:a="http://schemas.openxmlformats.org/drawingml/2006/main" xmlns:r="http://schemas.openxmlformats.org/officeDocument/2006/relationships" xmlns:p="http://schemas.openxmlformats.org/presentationml/2006/main">
   <p:cSld>
     <p:spTree>
       <p:nvGrpSpPr>
-        <p:cNvPr id="1" name="Shape 137"/>
+        <p:cNvPr id="1" name=""/>
         <p:cNvGrpSpPr/>
         <p:nvPr/>
       </p:nvGrpSpPr>
@@ -3836,12 +3920,12 @@
       </p:grpSpPr>
       <p:sp>
         <p:nvSpPr>
-          <p:cNvPr id="138" name="Shape 138"/>
+          <p:cNvPr id="2" name="Slide Image Placeholder 1"/>
           <p:cNvSpPr>
             <a:spLocks noGrp="1" noRot="1" noChangeAspect="1"/>
           </p:cNvSpPr>
           <p:nvPr>
-            <p:ph type="sldImg" idx="2"/>
+            <p:ph type="sldImg"/>
           </p:nvPr>
         </p:nvSpPr>
         <p:spPr>
@@ -3849,81 +3933,39 @@
             <a:off x="381000" y="685800"/>
             <a:ext cx="6096000" cy="3429000"/>
           </a:xfrm>
-          <a:custGeom>
-            <a:avLst/>
-            <a:gdLst/>
-            <a:ahLst/>
-            <a:cxnLst/>
-            <a:rect l="0" t="0" r="0" b="0"/>
-            <a:pathLst>
-              <a:path w="120000" h="120000" extrusionOk="0">
-                <a:moveTo>
-                  <a:pt x="0" y="0"/>
-                </a:moveTo>
-                <a:lnTo>
-                  <a:pt x="120000" y="0"/>
-                </a:lnTo>
-                <a:lnTo>
-                  <a:pt x="120000" y="120000"/>
-                </a:lnTo>
-                <a:lnTo>
-                  <a:pt x="0" y="120000"/>
-                </a:lnTo>
-                <a:close/>
-              </a:path>
-            </a:pathLst>
-          </a:custGeom>
-          <a:noFill/>
-          <a:ln w="9525" cap="flat" cmpd="sng">
-            <a:solidFill>
-              <a:srgbClr val="000000"/>
-            </a:solidFill>
-            <a:prstDash val="solid"/>
-            <a:round/>
-            <a:headEnd type="none" w="med" len="med"/>
-            <a:tailEnd type="none" w="med" len="med"/>
-          </a:ln>
         </p:spPr>
       </p:sp>
       <p:sp>
         <p:nvSpPr>
-          <p:cNvPr id="139" name="Shape 139"/>
-          <p:cNvSpPr txBox="1">
+          <p:cNvPr id="3" name="Notes Placeholder 2"/>
+          <p:cNvSpPr>
             <a:spLocks noGrp="1"/>
           </p:cNvSpPr>
           <p:nvPr>
             <p:ph type="body" idx="1"/>
           </p:nvPr>
         </p:nvSpPr>
-        <p:spPr>
-          <a:xfrm>
-            <a:off x="685800" y="4343400"/>
-            <a:ext cx="5486399" cy="4114800"/>
-          </a:xfrm>
-          <a:prstGeom prst="rect">
-            <a:avLst/>
-          </a:prstGeom>
-        </p:spPr>
+        <p:spPr/>
         <p:txBody>
-          <a:bodyPr lIns="91425" tIns="91425" rIns="91425" bIns="91425" anchor="t" anchorCtr="0">
-            <a:noAutofit/>
-          </a:bodyPr>
+          <a:bodyPr/>
           <a:lstStyle/>
           <a:p>
-            <a:pPr lvl="0" rtl="0">
-              <a:spcBef>
-                <a:spcPts val="0"/>
-              </a:spcBef>
-              <a:buNone/>
-            </a:pPr>
-            <a:endParaRPr/>
+            <a:r>
+              <a:rPr lang="en-GB" dirty="0" smtClean="0"/>
+              <a:t>We</a:t>
+            </a:r>
+            <a:r>
+              <a:rPr lang="en-GB" baseline="0" dirty="0" smtClean="0"/>
+              <a:t> have 2 contributions in Network Efficiency and Ensemble Learning.</a:t>
+            </a:r>
+            <a:endParaRPr lang="en-GB" dirty="0"/>
           </a:p>
         </p:txBody>
       </p:sp>
     </p:spTree>
     <p:extLst>
       <p:ext uri="{BB962C8B-B14F-4D97-AF65-F5344CB8AC3E}">
-        <p14:creationId xmlns:p14="http://schemas.microsoft.com/office/powerpoint/2010/main" val="3202518936"/>
+        <p14:creationId xmlns:p14="http://schemas.microsoft.com/office/powerpoint/2010/main" val="2275941018"/>
       </p:ext>
     </p:extLst>
   </p:cSld>
@@ -4032,14 +4074,58 @@
               </a:spcBef>
               <a:buNone/>
             </a:pPr>
-            <a:endParaRPr/>
+            <a:r>
+              <a:rPr lang="en-GB" dirty="0" smtClean="0"/>
+              <a:t>In</a:t>
+            </a:r>
+            <a:r>
+              <a:rPr lang="en-GB" baseline="0" dirty="0" smtClean="0"/>
+              <a:t> our system we have a stream of data, thus, we use an online algorithm called online stochastic gradient descent</a:t>
+            </a:r>
+          </a:p>
+          <a:p>
+            <a:pPr lvl="0" rtl="0">
+              <a:spcBef>
+                <a:spcPts val="0"/>
+              </a:spcBef>
+              <a:buNone/>
+            </a:pPr>
+            <a:r>
+              <a:rPr lang="en-GB" baseline="0" dirty="0" smtClean="0"/>
+              <a:t>The 3D graph on the right shows the Beijing Air Quality data. Z-Axis – air pollutants diameter 2.5, X-Axis – air pollutants diameter 1.0 and Y-Axis NO2</a:t>
+            </a:r>
+          </a:p>
+          <a:p>
+            <a:pPr lvl="0" rtl="0">
+              <a:spcBef>
+                <a:spcPts val="0"/>
+              </a:spcBef>
+              <a:buNone/>
+            </a:pPr>
+            <a:r>
+              <a:rPr lang="en-GB" baseline="0" dirty="0" smtClean="0"/>
+              <a:t>When new data arrives we update the weights of the function displayed.</a:t>
+            </a:r>
+          </a:p>
+          <a:p>
+            <a:pPr lvl="0" rtl="0">
+              <a:spcBef>
+                <a:spcPts val="0"/>
+              </a:spcBef>
+              <a:buNone/>
+            </a:pPr>
+            <a:r>
+              <a:rPr lang="en-GB" baseline="0" dirty="0" smtClean="0"/>
+              <a:t>The black line is the function that the system learnt from the 3D data points.</a:t>
+            </a:r>
+            <a:endParaRPr dirty="0"/>
           </a:p>
         </p:txBody>
       </p:sp>
     </p:spTree>
     <p:extLst>
       <p:ext uri="{BB962C8B-B14F-4D97-AF65-F5344CB8AC3E}">
-        <p14:creationId xmlns:p14="http://schemas.microsoft.com/office/powerpoint/2010/main" val="1362338301"/>
+        <p14:creationId xmlns:p14="http://schemas.microsoft.com/office/powerpoint/2010/main" val="3570477444"/>
       </p:ext>
     </p:extLst>
   </p:cSld>
@@ -4148,7 +4234,331 @@
               </a:spcBef>
               <a:buNone/>
             </a:pPr>
-            <a:endParaRPr/>
+            <a:r>
+              <a:rPr lang="en-GB" dirty="0" smtClean="0"/>
+              <a:t>This is the algorithm</a:t>
+            </a:r>
+            <a:r>
+              <a:rPr lang="en-GB" baseline="0" dirty="0" smtClean="0"/>
+              <a:t> which determines the network efficiency.</a:t>
+            </a:r>
+          </a:p>
+          <a:p>
+            <a:pPr lvl="0" rtl="0">
+              <a:spcBef>
+                <a:spcPts val="0"/>
+              </a:spcBef>
+              <a:buNone/>
+            </a:pPr>
+            <a:r>
+              <a:rPr lang="en-GB" dirty="0" smtClean="0"/>
+              <a:t>When</a:t>
+            </a:r>
+            <a:r>
+              <a:rPr lang="en-GB" baseline="0" dirty="0" smtClean="0"/>
+              <a:t> new data is read, we first update the local model using online stochastic gradient descent.</a:t>
+            </a:r>
+          </a:p>
+          <a:p>
+            <a:pPr lvl="0" rtl="0">
+              <a:spcBef>
+                <a:spcPts val="0"/>
+              </a:spcBef>
+              <a:buNone/>
+            </a:pPr>
+            <a:r>
+              <a:rPr lang="en-GB" baseline="0" dirty="0" smtClean="0"/>
+              <a:t>Then the cluster, using </a:t>
+            </a:r>
+            <a:r>
+              <a:rPr lang="en-GB" baseline="0" dirty="0" err="1" smtClean="0"/>
+              <a:t>kmeans</a:t>
+            </a:r>
+            <a:r>
+              <a:rPr lang="en-GB" baseline="0" dirty="0" smtClean="0"/>
+              <a:t>.</a:t>
+            </a:r>
+          </a:p>
+          <a:p>
+            <a:pPr lvl="0" rtl="0">
+              <a:spcBef>
+                <a:spcPts val="0"/>
+              </a:spcBef>
+              <a:buNone/>
+            </a:pPr>
+            <a:r>
+              <a:rPr lang="en-GB" baseline="0" dirty="0" smtClean="0"/>
+              <a:t>Afterwards we calculate the local error and concentrator error (since we store a copy)</a:t>
+            </a:r>
+          </a:p>
+          <a:p>
+            <a:pPr lvl="0" rtl="0">
+              <a:spcBef>
+                <a:spcPts val="0"/>
+              </a:spcBef>
+              <a:buNone/>
+            </a:pPr>
+            <a:r>
+              <a:rPr lang="en-GB" baseline="0" dirty="0" smtClean="0"/>
+              <a:t>Then we only send the new model if the difference in error is larger than a predefined THETA.</a:t>
+            </a:r>
+            <a:endParaRPr dirty="0"/>
+          </a:p>
+        </p:txBody>
+      </p:sp>
+    </p:spTree>
+    <p:extLst>
+      <p:ext uri="{BB962C8B-B14F-4D97-AF65-F5344CB8AC3E}">
+        <p14:creationId xmlns:p14="http://schemas.microsoft.com/office/powerpoint/2010/main" val="3202518936"/>
+      </p:ext>
+    </p:extLst>
+  </p:cSld>
+  <p:clrMapOvr>
+    <a:masterClrMapping/>
+  </p:clrMapOvr>
+</p:notes>
+</file>
+
+<file path=ppt/notesSlides/notesSlide13.xml><?xml version="1.0" encoding="utf-8"?>
+<p:notes xmlns:a="http://schemas.openxmlformats.org/drawingml/2006/main" xmlns:r="http://schemas.openxmlformats.org/officeDocument/2006/relationships" xmlns:p="http://schemas.openxmlformats.org/presentationml/2006/main" showMasterSp="0" showMasterPhAnim="0">
+  <p:cSld>
+    <p:spTree>
+      <p:nvGrpSpPr>
+        <p:cNvPr id="1" name="Shape 137"/>
+        <p:cNvGrpSpPr/>
+        <p:nvPr/>
+      </p:nvGrpSpPr>
+      <p:grpSpPr>
+        <a:xfrm>
+          <a:off x="0" y="0"/>
+          <a:ext cx="0" cy="0"/>
+          <a:chOff x="0" y="0"/>
+          <a:chExt cx="0" cy="0"/>
+        </a:xfrm>
+      </p:grpSpPr>
+      <p:sp>
+        <p:nvSpPr>
+          <p:cNvPr id="138" name="Shape 138"/>
+          <p:cNvSpPr>
+            <a:spLocks noGrp="1" noRot="1" noChangeAspect="1"/>
+          </p:cNvSpPr>
+          <p:nvPr>
+            <p:ph type="sldImg" idx="2"/>
+          </p:nvPr>
+        </p:nvSpPr>
+        <p:spPr>
+          <a:xfrm>
+            <a:off x="381000" y="685800"/>
+            <a:ext cx="6096000" cy="3429000"/>
+          </a:xfrm>
+          <a:custGeom>
+            <a:avLst/>
+            <a:gdLst/>
+            <a:ahLst/>
+            <a:cxnLst/>
+            <a:rect l="0" t="0" r="0" b="0"/>
+            <a:pathLst>
+              <a:path w="120000" h="120000" extrusionOk="0">
+                <a:moveTo>
+                  <a:pt x="0" y="0"/>
+                </a:moveTo>
+                <a:lnTo>
+                  <a:pt x="120000" y="0"/>
+                </a:lnTo>
+                <a:lnTo>
+                  <a:pt x="120000" y="120000"/>
+                </a:lnTo>
+                <a:lnTo>
+                  <a:pt x="0" y="120000"/>
+                </a:lnTo>
+                <a:close/>
+              </a:path>
+            </a:pathLst>
+          </a:custGeom>
+          <a:noFill/>
+          <a:ln w="9525" cap="flat" cmpd="sng">
+            <a:solidFill>
+              <a:srgbClr val="000000"/>
+            </a:solidFill>
+            <a:prstDash val="solid"/>
+            <a:round/>
+            <a:headEnd type="none" w="med" len="med"/>
+            <a:tailEnd type="none" w="med" len="med"/>
+          </a:ln>
+        </p:spPr>
+      </p:sp>
+      <p:sp>
+        <p:nvSpPr>
+          <p:cNvPr id="139" name="Shape 139"/>
+          <p:cNvSpPr txBox="1">
+            <a:spLocks noGrp="1"/>
+          </p:cNvSpPr>
+          <p:nvPr>
+            <p:ph type="body" idx="1"/>
+          </p:nvPr>
+        </p:nvSpPr>
+        <p:spPr>
+          <a:xfrm>
+            <a:off x="685800" y="4343400"/>
+            <a:ext cx="5486399" cy="4114800"/>
+          </a:xfrm>
+          <a:prstGeom prst="rect">
+            <a:avLst/>
+          </a:prstGeom>
+        </p:spPr>
+        <p:txBody>
+          <a:bodyPr lIns="91425" tIns="91425" rIns="91425" bIns="91425" anchor="t" anchorCtr="0">
+            <a:noAutofit/>
+          </a:bodyPr>
+          <a:lstStyle/>
+          <a:p>
+            <a:pPr lvl="0" rtl="0">
+              <a:spcBef>
+                <a:spcPts val="0"/>
+              </a:spcBef>
+              <a:buNone/>
+            </a:pPr>
+            <a:r>
+              <a:rPr lang="en-GB" dirty="0" smtClean="0"/>
+              <a:t>Along</a:t>
+            </a:r>
+            <a:r>
+              <a:rPr lang="en-GB" baseline="0" dirty="0" smtClean="0"/>
+              <a:t> with the regression model we transmit data representatives. An error associated with each representative, and the number of times it is used.</a:t>
+            </a:r>
+          </a:p>
+          <a:p>
+            <a:pPr lvl="0" rtl="0">
+              <a:spcBef>
+                <a:spcPts val="0"/>
+              </a:spcBef>
+              <a:buNone/>
+            </a:pPr>
+            <a:r>
+              <a:rPr lang="en-GB" baseline="0" dirty="0" smtClean="0"/>
+              <a:t>This would help the concentrator choose the ideal functions to use when a query arrives.</a:t>
+            </a:r>
+            <a:endParaRPr dirty="0"/>
+          </a:p>
+        </p:txBody>
+      </p:sp>
+    </p:spTree>
+    <p:extLst>
+      <p:ext uri="{BB962C8B-B14F-4D97-AF65-F5344CB8AC3E}">
+        <p14:creationId xmlns:p14="http://schemas.microsoft.com/office/powerpoint/2010/main" val="1362338301"/>
+      </p:ext>
+    </p:extLst>
+  </p:cSld>
+  <p:clrMapOvr>
+    <a:masterClrMapping/>
+  </p:clrMapOvr>
+</p:notes>
+</file>
+
+<file path=ppt/notesSlides/notesSlide14.xml><?xml version="1.0" encoding="utf-8"?>
+<p:notes xmlns:a="http://schemas.openxmlformats.org/drawingml/2006/main" xmlns:r="http://schemas.openxmlformats.org/officeDocument/2006/relationships" xmlns:p="http://schemas.openxmlformats.org/presentationml/2006/main" showMasterSp="0" showMasterPhAnim="0">
+  <p:cSld>
+    <p:spTree>
+      <p:nvGrpSpPr>
+        <p:cNvPr id="1" name="Shape 137"/>
+        <p:cNvGrpSpPr/>
+        <p:nvPr/>
+      </p:nvGrpSpPr>
+      <p:grpSpPr>
+        <a:xfrm>
+          <a:off x="0" y="0"/>
+          <a:ext cx="0" cy="0"/>
+          <a:chOff x="0" y="0"/>
+          <a:chExt cx="0" cy="0"/>
+        </a:xfrm>
+      </p:grpSpPr>
+      <p:sp>
+        <p:nvSpPr>
+          <p:cNvPr id="138" name="Shape 138"/>
+          <p:cNvSpPr>
+            <a:spLocks noGrp="1" noRot="1" noChangeAspect="1"/>
+          </p:cNvSpPr>
+          <p:nvPr>
+            <p:ph type="sldImg" idx="2"/>
+          </p:nvPr>
+        </p:nvSpPr>
+        <p:spPr>
+          <a:xfrm>
+            <a:off x="381000" y="685800"/>
+            <a:ext cx="6096000" cy="3429000"/>
+          </a:xfrm>
+          <a:custGeom>
+            <a:avLst/>
+            <a:gdLst/>
+            <a:ahLst/>
+            <a:cxnLst/>
+            <a:rect l="0" t="0" r="0" b="0"/>
+            <a:pathLst>
+              <a:path w="120000" h="120000" extrusionOk="0">
+                <a:moveTo>
+                  <a:pt x="0" y="0"/>
+                </a:moveTo>
+                <a:lnTo>
+                  <a:pt x="120000" y="0"/>
+                </a:lnTo>
+                <a:lnTo>
+                  <a:pt x="120000" y="120000"/>
+                </a:lnTo>
+                <a:lnTo>
+                  <a:pt x="0" y="120000"/>
+                </a:lnTo>
+                <a:close/>
+              </a:path>
+            </a:pathLst>
+          </a:custGeom>
+          <a:noFill/>
+          <a:ln w="9525" cap="flat" cmpd="sng">
+            <a:solidFill>
+              <a:srgbClr val="000000"/>
+            </a:solidFill>
+            <a:prstDash val="solid"/>
+            <a:round/>
+            <a:headEnd type="none" w="med" len="med"/>
+            <a:tailEnd type="none" w="med" len="med"/>
+          </a:ln>
+        </p:spPr>
+      </p:sp>
+      <p:sp>
+        <p:nvSpPr>
+          <p:cNvPr id="139" name="Shape 139"/>
+          <p:cNvSpPr txBox="1">
+            <a:spLocks noGrp="1"/>
+          </p:cNvSpPr>
+          <p:nvPr>
+            <p:ph type="body" idx="1"/>
+          </p:nvPr>
+        </p:nvSpPr>
+        <p:spPr>
+          <a:xfrm>
+            <a:off x="685800" y="4343400"/>
+            <a:ext cx="5486399" cy="4114800"/>
+          </a:xfrm>
+          <a:prstGeom prst="rect">
+            <a:avLst/>
+          </a:prstGeom>
+        </p:spPr>
+        <p:txBody>
+          <a:bodyPr lIns="91425" tIns="91425" rIns="91425" bIns="91425" anchor="t" anchorCtr="0">
+            <a:noAutofit/>
+          </a:bodyPr>
+          <a:lstStyle/>
+          <a:p>
+            <a:pPr lvl="0" rtl="0">
+              <a:spcBef>
+                <a:spcPts val="0"/>
+              </a:spcBef>
+              <a:buNone/>
+            </a:pPr>
+            <a:r>
+              <a:rPr lang="en-GB" dirty="0" smtClean="0"/>
+              <a:t>This is the function used to calculate the weight at the concentrator.</a:t>
+            </a:r>
+            <a:endParaRPr dirty="0"/>
           </a:p>
         </p:txBody>
       </p:sp>
@@ -4165,7 +4575,7 @@
 </p:notes>
 </file>
 
-<file path=ppt/notesSlides/notesSlide13.xml><?xml version="1.0" encoding="utf-8"?>
+<file path=ppt/notesSlides/notesSlide15.xml><?xml version="1.0" encoding="utf-8"?>
 <p:notes xmlns:a="http://schemas.openxmlformats.org/drawingml/2006/main" xmlns:r="http://schemas.openxmlformats.org/officeDocument/2006/relationships" xmlns:p="http://schemas.openxmlformats.org/presentationml/2006/main" showMasterSp="0" showMasterPhAnim="0">
   <p:cSld>
     <p:spTree>
@@ -4264,7 +4674,15 @@
               </a:spcBef>
               <a:buNone/>
             </a:pPr>
-            <a:endParaRPr/>
+            <a:r>
+              <a:rPr lang="en-GB" dirty="0" smtClean="0"/>
+              <a:t>I</a:t>
+            </a:r>
+            <a:r>
+              <a:rPr lang="en-GB" baseline="0" dirty="0" smtClean="0"/>
+              <a:t> will now explain our findings.</a:t>
+            </a:r>
+            <a:endParaRPr dirty="0"/>
           </a:p>
         </p:txBody>
       </p:sp>
@@ -4272,238 +4690,6 @@
     <p:extLst>
       <p:ext uri="{BB962C8B-B14F-4D97-AF65-F5344CB8AC3E}">
         <p14:creationId xmlns:p14="http://schemas.microsoft.com/office/powerpoint/2010/main" val="2825632907"/>
-      </p:ext>
-    </p:extLst>
-  </p:cSld>
-  <p:clrMapOvr>
-    <a:masterClrMapping/>
-  </p:clrMapOvr>
-</p:notes>
-</file>
-
-<file path=ppt/notesSlides/notesSlide14.xml><?xml version="1.0" encoding="utf-8"?>
-<p:notes xmlns:a="http://schemas.openxmlformats.org/drawingml/2006/main" xmlns:r="http://schemas.openxmlformats.org/officeDocument/2006/relationships" xmlns:p="http://schemas.openxmlformats.org/presentationml/2006/main" showMasterSp="0" showMasterPhAnim="0">
-  <p:cSld>
-    <p:spTree>
-      <p:nvGrpSpPr>
-        <p:cNvPr id="1" name="Shape 318"/>
-        <p:cNvGrpSpPr/>
-        <p:nvPr/>
-      </p:nvGrpSpPr>
-      <p:grpSpPr>
-        <a:xfrm>
-          <a:off x="0" y="0"/>
-          <a:ext cx="0" cy="0"/>
-          <a:chOff x="0" y="0"/>
-          <a:chExt cx="0" cy="0"/>
-        </a:xfrm>
-      </p:grpSpPr>
-      <p:sp>
-        <p:nvSpPr>
-          <p:cNvPr id="319" name="Shape 319"/>
-          <p:cNvSpPr>
-            <a:spLocks noGrp="1" noRot="1" noChangeAspect="1"/>
-          </p:cNvSpPr>
-          <p:nvPr>
-            <p:ph type="sldImg" idx="2"/>
-          </p:nvPr>
-        </p:nvSpPr>
-        <p:spPr>
-          <a:xfrm>
-            <a:off x="381000" y="685800"/>
-            <a:ext cx="6096000" cy="3429000"/>
-          </a:xfrm>
-          <a:custGeom>
-            <a:avLst/>
-            <a:gdLst/>
-            <a:ahLst/>
-            <a:cxnLst/>
-            <a:rect l="0" t="0" r="0" b="0"/>
-            <a:pathLst>
-              <a:path w="120000" h="120000" extrusionOk="0">
-                <a:moveTo>
-                  <a:pt x="0" y="0"/>
-                </a:moveTo>
-                <a:lnTo>
-                  <a:pt x="120000" y="0"/>
-                </a:lnTo>
-                <a:lnTo>
-                  <a:pt x="120000" y="120000"/>
-                </a:lnTo>
-                <a:lnTo>
-                  <a:pt x="0" y="120000"/>
-                </a:lnTo>
-                <a:close/>
-              </a:path>
-            </a:pathLst>
-          </a:custGeom>
-          <a:noFill/>
-          <a:ln w="9525" cap="flat" cmpd="sng">
-            <a:solidFill>
-              <a:srgbClr val="000000"/>
-            </a:solidFill>
-            <a:prstDash val="solid"/>
-            <a:round/>
-            <a:headEnd type="none" w="med" len="med"/>
-            <a:tailEnd type="none" w="med" len="med"/>
-          </a:ln>
-        </p:spPr>
-      </p:sp>
-      <p:sp>
-        <p:nvSpPr>
-          <p:cNvPr id="320" name="Shape 320"/>
-          <p:cNvSpPr txBox="1">
-            <a:spLocks noGrp="1"/>
-          </p:cNvSpPr>
-          <p:nvPr>
-            <p:ph type="body" idx="1"/>
-          </p:nvPr>
-        </p:nvSpPr>
-        <p:spPr>
-          <a:xfrm>
-            <a:off x="685800" y="4343400"/>
-            <a:ext cx="5486399" cy="4114800"/>
-          </a:xfrm>
-          <a:prstGeom prst="rect">
-            <a:avLst/>
-          </a:prstGeom>
-        </p:spPr>
-        <p:txBody>
-          <a:bodyPr lIns="91425" tIns="91425" rIns="91425" bIns="91425" anchor="t" anchorCtr="0">
-            <a:noAutofit/>
-          </a:bodyPr>
-          <a:lstStyle/>
-          <a:p>
-            <a:pPr>
-              <a:spcBef>
-                <a:spcPts val="0"/>
-              </a:spcBef>
-              <a:buNone/>
-            </a:pPr>
-            <a:endParaRPr/>
-          </a:p>
-        </p:txBody>
-      </p:sp>
-    </p:spTree>
-    <p:extLst>
-      <p:ext uri="{BB962C8B-B14F-4D97-AF65-F5344CB8AC3E}">
-        <p14:creationId xmlns:p14="http://schemas.microsoft.com/office/powerpoint/2010/main" val="4141103178"/>
-      </p:ext>
-    </p:extLst>
-  </p:cSld>
-  <p:clrMapOvr>
-    <a:masterClrMapping/>
-  </p:clrMapOvr>
-</p:notes>
-</file>
-
-<file path=ppt/notesSlides/notesSlide15.xml><?xml version="1.0" encoding="utf-8"?>
-<p:notes xmlns:a="http://schemas.openxmlformats.org/drawingml/2006/main" xmlns:r="http://schemas.openxmlformats.org/officeDocument/2006/relationships" xmlns:p="http://schemas.openxmlformats.org/presentationml/2006/main" showMasterSp="0" showMasterPhAnim="0">
-  <p:cSld>
-    <p:spTree>
-      <p:nvGrpSpPr>
-        <p:cNvPr id="1" name="Shape 318"/>
-        <p:cNvGrpSpPr/>
-        <p:nvPr/>
-      </p:nvGrpSpPr>
-      <p:grpSpPr>
-        <a:xfrm>
-          <a:off x="0" y="0"/>
-          <a:ext cx="0" cy="0"/>
-          <a:chOff x="0" y="0"/>
-          <a:chExt cx="0" cy="0"/>
-        </a:xfrm>
-      </p:grpSpPr>
-      <p:sp>
-        <p:nvSpPr>
-          <p:cNvPr id="319" name="Shape 319"/>
-          <p:cNvSpPr>
-            <a:spLocks noGrp="1" noRot="1" noChangeAspect="1"/>
-          </p:cNvSpPr>
-          <p:nvPr>
-            <p:ph type="sldImg" idx="2"/>
-          </p:nvPr>
-        </p:nvSpPr>
-        <p:spPr>
-          <a:xfrm>
-            <a:off x="381000" y="685800"/>
-            <a:ext cx="6096000" cy="3429000"/>
-          </a:xfrm>
-          <a:custGeom>
-            <a:avLst/>
-            <a:gdLst/>
-            <a:ahLst/>
-            <a:cxnLst/>
-            <a:rect l="0" t="0" r="0" b="0"/>
-            <a:pathLst>
-              <a:path w="120000" h="120000" extrusionOk="0">
-                <a:moveTo>
-                  <a:pt x="0" y="0"/>
-                </a:moveTo>
-                <a:lnTo>
-                  <a:pt x="120000" y="0"/>
-                </a:lnTo>
-                <a:lnTo>
-                  <a:pt x="120000" y="120000"/>
-                </a:lnTo>
-                <a:lnTo>
-                  <a:pt x="0" y="120000"/>
-                </a:lnTo>
-                <a:close/>
-              </a:path>
-            </a:pathLst>
-          </a:custGeom>
-          <a:noFill/>
-          <a:ln w="9525" cap="flat" cmpd="sng">
-            <a:solidFill>
-              <a:srgbClr val="000000"/>
-            </a:solidFill>
-            <a:prstDash val="solid"/>
-            <a:round/>
-            <a:headEnd type="none" w="med" len="med"/>
-            <a:tailEnd type="none" w="med" len="med"/>
-          </a:ln>
-        </p:spPr>
-      </p:sp>
-      <p:sp>
-        <p:nvSpPr>
-          <p:cNvPr id="320" name="Shape 320"/>
-          <p:cNvSpPr txBox="1">
-            <a:spLocks noGrp="1"/>
-          </p:cNvSpPr>
-          <p:nvPr>
-            <p:ph type="body" idx="1"/>
-          </p:nvPr>
-        </p:nvSpPr>
-        <p:spPr>
-          <a:xfrm>
-            <a:off x="685800" y="4343400"/>
-            <a:ext cx="5486399" cy="4114800"/>
-          </a:xfrm>
-          <a:prstGeom prst="rect">
-            <a:avLst/>
-          </a:prstGeom>
-        </p:spPr>
-        <p:txBody>
-          <a:bodyPr lIns="91425" tIns="91425" rIns="91425" bIns="91425" anchor="t" anchorCtr="0">
-            <a:noAutofit/>
-          </a:bodyPr>
-          <a:lstStyle/>
-          <a:p>
-            <a:pPr>
-              <a:spcBef>
-                <a:spcPts val="0"/>
-              </a:spcBef>
-              <a:buNone/>
-            </a:pPr>
-            <a:endParaRPr/>
-          </a:p>
-        </p:txBody>
-      </p:sp>
-    </p:spTree>
-    <p:extLst>
-      <p:ext uri="{BB962C8B-B14F-4D97-AF65-F5344CB8AC3E}">
-        <p14:creationId xmlns:p14="http://schemas.microsoft.com/office/powerpoint/2010/main" val="4243122307"/>
       </p:ext>
     </p:extLst>
   </p:cSld>
@@ -4612,14 +4798,22 @@
               </a:spcBef>
               <a:buNone/>
             </a:pPr>
-            <a:endParaRPr/>
+            <a:r>
+              <a:rPr lang="en-GB" dirty="0" smtClean="0"/>
+              <a:t>This graph shows the THETA vs</a:t>
+            </a:r>
+            <a:r>
+              <a:rPr lang="en-GB" baseline="0" dirty="0" smtClean="0"/>
+              <a:t> Messages Sent. Example at THETA 0 -100% of the messages are sent and at THETA 0.5 – 10% of the messages are sent.</a:t>
+            </a:r>
+            <a:endParaRPr dirty="0"/>
           </a:p>
         </p:txBody>
       </p:sp>
     </p:spTree>
     <p:extLst>
       <p:ext uri="{BB962C8B-B14F-4D97-AF65-F5344CB8AC3E}">
-        <p14:creationId xmlns:p14="http://schemas.microsoft.com/office/powerpoint/2010/main" val="662858925"/>
+        <p14:creationId xmlns:p14="http://schemas.microsoft.com/office/powerpoint/2010/main" val="4141103178"/>
       </p:ext>
     </p:extLst>
   </p:cSld>
@@ -4728,14 +4922,22 @@
               </a:spcBef>
               <a:buNone/>
             </a:pPr>
-            <a:endParaRPr/>
+            <a:r>
+              <a:rPr lang="en-GB" dirty="0" smtClean="0"/>
+              <a:t>THETA represents</a:t>
+            </a:r>
+            <a:r>
+              <a:rPr lang="en-GB" baseline="0" dirty="0" smtClean="0"/>
+              <a:t> how strict the system is towards updating the model at the concentrator. As one can see the large THETA is the larger the error.</a:t>
+            </a:r>
+            <a:endParaRPr dirty="0"/>
           </a:p>
         </p:txBody>
       </p:sp>
     </p:spTree>
     <p:extLst>
       <p:ext uri="{BB962C8B-B14F-4D97-AF65-F5344CB8AC3E}">
-        <p14:creationId xmlns:p14="http://schemas.microsoft.com/office/powerpoint/2010/main" val="2727946801"/>
+        <p14:creationId xmlns:p14="http://schemas.microsoft.com/office/powerpoint/2010/main" val="4243122307"/>
       </p:ext>
     </p:extLst>
   </p:cSld>
@@ -4844,7 +5046,459 @@
               </a:spcBef>
               <a:buNone/>
             </a:pPr>
-            <a:endParaRPr/>
+            <a:r>
+              <a:rPr lang="en-GB" dirty="0" smtClean="0"/>
+              <a:t>Joining</a:t>
+            </a:r>
+            <a:r>
+              <a:rPr lang="en-GB" baseline="0" dirty="0" smtClean="0"/>
+              <a:t> the 2 graphs together by removing THETA we can see the relationship between messages sent and difference in error. An interesting thing is for example sending just 60% of messages has barely any effect on the overall error. Meaning that 40% of the messages had no new knowledge.</a:t>
+            </a:r>
+            <a:endParaRPr dirty="0"/>
+          </a:p>
+        </p:txBody>
+      </p:sp>
+    </p:spTree>
+    <p:extLst>
+      <p:ext uri="{BB962C8B-B14F-4D97-AF65-F5344CB8AC3E}">
+        <p14:creationId xmlns:p14="http://schemas.microsoft.com/office/powerpoint/2010/main" val="662858925"/>
+      </p:ext>
+    </p:extLst>
+  </p:cSld>
+  <p:clrMapOvr>
+    <a:masterClrMapping/>
+  </p:clrMapOvr>
+</p:notes>
+</file>
+
+<file path=ppt/notesSlides/notesSlide19.xml><?xml version="1.0" encoding="utf-8"?>
+<p:notes xmlns:a="http://schemas.openxmlformats.org/drawingml/2006/main" xmlns:r="http://schemas.openxmlformats.org/officeDocument/2006/relationships" xmlns:p="http://schemas.openxmlformats.org/presentationml/2006/main" showMasterSp="0" showMasterPhAnim="0">
+  <p:cSld>
+    <p:spTree>
+      <p:nvGrpSpPr>
+        <p:cNvPr id="1" name="Shape 318"/>
+        <p:cNvGrpSpPr/>
+        <p:nvPr/>
+      </p:nvGrpSpPr>
+      <p:grpSpPr>
+        <a:xfrm>
+          <a:off x="0" y="0"/>
+          <a:ext cx="0" cy="0"/>
+          <a:chOff x="0" y="0"/>
+          <a:chExt cx="0" cy="0"/>
+        </a:xfrm>
+      </p:grpSpPr>
+      <p:sp>
+        <p:nvSpPr>
+          <p:cNvPr id="319" name="Shape 319"/>
+          <p:cNvSpPr>
+            <a:spLocks noGrp="1" noRot="1" noChangeAspect="1"/>
+          </p:cNvSpPr>
+          <p:nvPr>
+            <p:ph type="sldImg" idx="2"/>
+          </p:nvPr>
+        </p:nvSpPr>
+        <p:spPr>
+          <a:xfrm>
+            <a:off x="381000" y="685800"/>
+            <a:ext cx="6096000" cy="3429000"/>
+          </a:xfrm>
+          <a:custGeom>
+            <a:avLst/>
+            <a:gdLst/>
+            <a:ahLst/>
+            <a:cxnLst/>
+            <a:rect l="0" t="0" r="0" b="0"/>
+            <a:pathLst>
+              <a:path w="120000" h="120000" extrusionOk="0">
+                <a:moveTo>
+                  <a:pt x="0" y="0"/>
+                </a:moveTo>
+                <a:lnTo>
+                  <a:pt x="120000" y="0"/>
+                </a:lnTo>
+                <a:lnTo>
+                  <a:pt x="120000" y="120000"/>
+                </a:lnTo>
+                <a:lnTo>
+                  <a:pt x="0" y="120000"/>
+                </a:lnTo>
+                <a:close/>
+              </a:path>
+            </a:pathLst>
+          </a:custGeom>
+          <a:noFill/>
+          <a:ln w="9525" cap="flat" cmpd="sng">
+            <a:solidFill>
+              <a:srgbClr val="000000"/>
+            </a:solidFill>
+            <a:prstDash val="solid"/>
+            <a:round/>
+            <a:headEnd type="none" w="med" len="med"/>
+            <a:tailEnd type="none" w="med" len="med"/>
+          </a:ln>
+        </p:spPr>
+      </p:sp>
+      <p:sp>
+        <p:nvSpPr>
+          <p:cNvPr id="320" name="Shape 320"/>
+          <p:cNvSpPr txBox="1">
+            <a:spLocks noGrp="1"/>
+          </p:cNvSpPr>
+          <p:nvPr>
+            <p:ph type="body" idx="1"/>
+          </p:nvPr>
+        </p:nvSpPr>
+        <p:spPr>
+          <a:xfrm>
+            <a:off x="685800" y="4343400"/>
+            <a:ext cx="5486399" cy="4114800"/>
+          </a:xfrm>
+          <a:prstGeom prst="rect">
+            <a:avLst/>
+          </a:prstGeom>
+        </p:spPr>
+        <p:txBody>
+          <a:bodyPr lIns="91425" tIns="91425" rIns="91425" bIns="91425" anchor="t" anchorCtr="0">
+            <a:noAutofit/>
+          </a:bodyPr>
+          <a:lstStyle/>
+          <a:p>
+            <a:pPr>
+              <a:spcBef>
+                <a:spcPts val="0"/>
+              </a:spcBef>
+              <a:buNone/>
+            </a:pPr>
+            <a:r>
+              <a:rPr lang="en-GB" dirty="0" smtClean="0"/>
+              <a:t>The next 2 slides now show the query accuracy at the concentrator using</a:t>
+            </a:r>
+            <a:r>
+              <a:rPr lang="en-GB" baseline="0" dirty="0" smtClean="0"/>
+              <a:t> different algorithms at different THETA.</a:t>
+            </a:r>
+          </a:p>
+          <a:p>
+            <a:pPr>
+              <a:spcBef>
+                <a:spcPts val="0"/>
+              </a:spcBef>
+              <a:buNone/>
+            </a:pPr>
+            <a:r>
+              <a:rPr lang="en-GB" baseline="0" dirty="0" smtClean="0"/>
+              <a:t>Baseline is the naïve model which transmits all the raw data.</a:t>
+            </a:r>
+          </a:p>
+          <a:p>
+            <a:pPr>
+              <a:spcBef>
+                <a:spcPts val="0"/>
+              </a:spcBef>
+              <a:buNone/>
+            </a:pPr>
+            <a:r>
+              <a:rPr lang="en-GB" baseline="0" dirty="0" smtClean="0"/>
+              <a:t>Ideal is using the knowledge from only the right sensor. ( we know it since it is a test scenario)</a:t>
+            </a:r>
+          </a:p>
+          <a:p>
+            <a:pPr>
+              <a:spcBef>
+                <a:spcPts val="0"/>
+              </a:spcBef>
+              <a:buNone/>
+            </a:pPr>
+            <a:r>
+              <a:rPr lang="en-GB" baseline="0" dirty="0" smtClean="0"/>
+              <a:t>Average is the one where we average all the functions</a:t>
+            </a:r>
+          </a:p>
+          <a:p>
+            <a:pPr>
+              <a:spcBef>
+                <a:spcPts val="0"/>
+              </a:spcBef>
+              <a:buNone/>
+            </a:pPr>
+            <a:r>
+              <a:rPr lang="en-GB" baseline="0" dirty="0" smtClean="0"/>
+              <a:t>Distance is the one which uses only the closest functions depending on KNN</a:t>
+            </a:r>
+          </a:p>
+          <a:p>
+            <a:pPr>
+              <a:spcBef>
+                <a:spcPts val="0"/>
+              </a:spcBef>
+              <a:buNone/>
+            </a:pPr>
+            <a:r>
+              <a:rPr lang="en-GB" baseline="0" dirty="0" smtClean="0"/>
+              <a:t>Reliability is the one which uses the functions with highest weight depending on KNN</a:t>
+            </a:r>
+          </a:p>
+          <a:p>
+            <a:pPr>
+              <a:spcBef>
+                <a:spcPts val="0"/>
+              </a:spcBef>
+              <a:buNone/>
+            </a:pPr>
+            <a:r>
+              <a:rPr lang="en-GB" baseline="0" dirty="0" smtClean="0"/>
+              <a:t>From the 3D plot we can see that we should try to approach the Baseline. The average solution provides better results than the ideal suggesting there is a subset of functions better than the average.  At higher KNN the Reliability algorithm provides better results than the average.</a:t>
+            </a:r>
+            <a:endParaRPr lang="en-GB" baseline="0" dirty="0"/>
+          </a:p>
+        </p:txBody>
+      </p:sp>
+    </p:spTree>
+    <p:extLst>
+      <p:ext uri="{BB962C8B-B14F-4D97-AF65-F5344CB8AC3E}">
+        <p14:creationId xmlns:p14="http://schemas.microsoft.com/office/powerpoint/2010/main" val="2727946801"/>
+      </p:ext>
+    </p:extLst>
+  </p:cSld>
+  <p:clrMapOvr>
+    <a:masterClrMapping/>
+  </p:clrMapOvr>
+</p:notes>
+</file>
+
+<file path=ppt/notesSlides/notesSlide2.xml><?xml version="1.0" encoding="utf-8"?>
+<p:notes xmlns:a="http://schemas.openxmlformats.org/drawingml/2006/main" xmlns:r="http://schemas.openxmlformats.org/officeDocument/2006/relationships" xmlns:p="http://schemas.openxmlformats.org/presentationml/2006/main" showMasterSp="0" showMasterPhAnim="0">
+  <p:cSld>
+    <p:spTree>
+      <p:nvGrpSpPr>
+        <p:cNvPr id="1" name="Shape 120"/>
+        <p:cNvGrpSpPr/>
+        <p:nvPr/>
+      </p:nvGrpSpPr>
+      <p:grpSpPr>
+        <a:xfrm>
+          <a:off x="0" y="0"/>
+          <a:ext cx="0" cy="0"/>
+          <a:chOff x="0" y="0"/>
+          <a:chExt cx="0" cy="0"/>
+        </a:xfrm>
+      </p:grpSpPr>
+      <p:sp>
+        <p:nvSpPr>
+          <p:cNvPr id="121" name="Shape 121"/>
+          <p:cNvSpPr txBox="1">
+            <a:spLocks noGrp="1"/>
+          </p:cNvSpPr>
+          <p:nvPr>
+            <p:ph type="body" idx="1"/>
+          </p:nvPr>
+        </p:nvSpPr>
+        <p:spPr>
+          <a:xfrm>
+            <a:off x="685800" y="4343400"/>
+            <a:ext cx="5486399" cy="4114800"/>
+          </a:xfrm>
+          <a:prstGeom prst="rect">
+            <a:avLst/>
+          </a:prstGeom>
+        </p:spPr>
+        <p:txBody>
+          <a:bodyPr lIns="91425" tIns="91425" rIns="91425" bIns="91425" anchor="ctr" anchorCtr="0">
+            <a:noAutofit/>
+          </a:bodyPr>
+          <a:lstStyle/>
+          <a:p>
+            <a:pPr>
+              <a:spcBef>
+                <a:spcPts val="0"/>
+              </a:spcBef>
+              <a:buNone/>
+            </a:pPr>
+            <a:r>
+              <a:rPr lang="en-GB" dirty="0" smtClean="0"/>
+              <a:t>I’ll start of by explaining what the internet of things</a:t>
+            </a:r>
+            <a:r>
+              <a:rPr lang="en-GB" baseline="0" dirty="0" smtClean="0"/>
+              <a:t> is ..</a:t>
+            </a:r>
+            <a:endParaRPr dirty="0"/>
+          </a:p>
+        </p:txBody>
+      </p:sp>
+      <p:sp>
+        <p:nvSpPr>
+          <p:cNvPr id="122" name="Shape 122"/>
+          <p:cNvSpPr>
+            <a:spLocks noGrp="1" noRot="1" noChangeAspect="1"/>
+          </p:cNvSpPr>
+          <p:nvPr>
+            <p:ph type="sldImg" idx="2"/>
+          </p:nvPr>
+        </p:nvSpPr>
+        <p:spPr>
+          <a:xfrm>
+            <a:off x="381000" y="685800"/>
+            <a:ext cx="6096000" cy="3429000"/>
+          </a:xfrm>
+          <a:custGeom>
+            <a:avLst/>
+            <a:gdLst/>
+            <a:ahLst/>
+            <a:cxnLst/>
+            <a:rect l="0" t="0" r="0" b="0"/>
+            <a:pathLst>
+              <a:path w="120000" h="120000" extrusionOk="0">
+                <a:moveTo>
+                  <a:pt x="0" y="0"/>
+                </a:moveTo>
+                <a:lnTo>
+                  <a:pt x="120000" y="0"/>
+                </a:lnTo>
+                <a:lnTo>
+                  <a:pt x="120000" y="120000"/>
+                </a:lnTo>
+                <a:lnTo>
+                  <a:pt x="0" y="120000"/>
+                </a:lnTo>
+                <a:close/>
+              </a:path>
+            </a:pathLst>
+          </a:custGeom>
+          <a:noFill/>
+          <a:ln w="9525" cap="flat" cmpd="sng">
+            <a:solidFill>
+              <a:srgbClr val="000000"/>
+            </a:solidFill>
+            <a:prstDash val="solid"/>
+            <a:round/>
+            <a:headEnd type="none" w="med" len="med"/>
+            <a:tailEnd type="none" w="med" len="med"/>
+          </a:ln>
+        </p:spPr>
+      </p:sp>
+    </p:spTree>
+    <p:extLst>
+      <p:ext uri="{BB962C8B-B14F-4D97-AF65-F5344CB8AC3E}">
+        <p14:creationId xmlns:p14="http://schemas.microsoft.com/office/powerpoint/2010/main" val="3385273336"/>
+      </p:ext>
+    </p:extLst>
+  </p:cSld>
+  <p:clrMapOvr>
+    <a:masterClrMapping/>
+  </p:clrMapOvr>
+</p:notes>
+</file>
+
+<file path=ppt/notesSlides/notesSlide20.xml><?xml version="1.0" encoding="utf-8"?>
+<p:notes xmlns:a="http://schemas.openxmlformats.org/drawingml/2006/main" xmlns:r="http://schemas.openxmlformats.org/officeDocument/2006/relationships" xmlns:p="http://schemas.openxmlformats.org/presentationml/2006/main" showMasterSp="0" showMasterPhAnim="0">
+  <p:cSld>
+    <p:spTree>
+      <p:nvGrpSpPr>
+        <p:cNvPr id="1" name="Shape 318"/>
+        <p:cNvGrpSpPr/>
+        <p:nvPr/>
+      </p:nvGrpSpPr>
+      <p:grpSpPr>
+        <a:xfrm>
+          <a:off x="0" y="0"/>
+          <a:ext cx="0" cy="0"/>
+          <a:chOff x="0" y="0"/>
+          <a:chExt cx="0" cy="0"/>
+        </a:xfrm>
+      </p:grpSpPr>
+      <p:sp>
+        <p:nvSpPr>
+          <p:cNvPr id="319" name="Shape 319"/>
+          <p:cNvSpPr>
+            <a:spLocks noGrp="1" noRot="1" noChangeAspect="1"/>
+          </p:cNvSpPr>
+          <p:nvPr>
+            <p:ph type="sldImg" idx="2"/>
+          </p:nvPr>
+        </p:nvSpPr>
+        <p:spPr>
+          <a:xfrm>
+            <a:off x="381000" y="685800"/>
+            <a:ext cx="6096000" cy="3429000"/>
+          </a:xfrm>
+          <a:custGeom>
+            <a:avLst/>
+            <a:gdLst/>
+            <a:ahLst/>
+            <a:cxnLst/>
+            <a:rect l="0" t="0" r="0" b="0"/>
+            <a:pathLst>
+              <a:path w="120000" h="120000" extrusionOk="0">
+                <a:moveTo>
+                  <a:pt x="0" y="0"/>
+                </a:moveTo>
+                <a:lnTo>
+                  <a:pt x="120000" y="0"/>
+                </a:lnTo>
+                <a:lnTo>
+                  <a:pt x="120000" y="120000"/>
+                </a:lnTo>
+                <a:lnTo>
+                  <a:pt x="0" y="120000"/>
+                </a:lnTo>
+                <a:close/>
+              </a:path>
+            </a:pathLst>
+          </a:custGeom>
+          <a:noFill/>
+          <a:ln w="9525" cap="flat" cmpd="sng">
+            <a:solidFill>
+              <a:srgbClr val="000000"/>
+            </a:solidFill>
+            <a:prstDash val="solid"/>
+            <a:round/>
+            <a:headEnd type="none" w="med" len="med"/>
+            <a:tailEnd type="none" w="med" len="med"/>
+          </a:ln>
+        </p:spPr>
+      </p:sp>
+      <p:sp>
+        <p:nvSpPr>
+          <p:cNvPr id="320" name="Shape 320"/>
+          <p:cNvSpPr txBox="1">
+            <a:spLocks noGrp="1"/>
+          </p:cNvSpPr>
+          <p:nvPr>
+            <p:ph type="body" idx="1"/>
+          </p:nvPr>
+        </p:nvSpPr>
+        <p:spPr>
+          <a:xfrm>
+            <a:off x="685800" y="4343400"/>
+            <a:ext cx="5486399" cy="4114800"/>
+          </a:xfrm>
+          <a:prstGeom prst="rect">
+            <a:avLst/>
+          </a:prstGeom>
+        </p:spPr>
+        <p:txBody>
+          <a:bodyPr lIns="91425" tIns="91425" rIns="91425" bIns="91425" anchor="t" anchorCtr="0">
+            <a:noAutofit/>
+          </a:bodyPr>
+          <a:lstStyle/>
+          <a:p>
+            <a:pPr>
+              <a:spcBef>
+                <a:spcPts val="0"/>
+              </a:spcBef>
+              <a:buNone/>
+            </a:pPr>
+            <a:r>
+              <a:rPr lang="en-GB" dirty="0" smtClean="0"/>
+              <a:t>We can see the same things at</a:t>
+            </a:r>
+            <a:r>
+              <a:rPr lang="en-GB" baseline="0" dirty="0" smtClean="0"/>
+              <a:t> a higher THETA.</a:t>
+            </a:r>
+            <a:endParaRPr dirty="0"/>
           </a:p>
         </p:txBody>
       </p:sp>
@@ -4861,7 +5515,7 @@
 </p:notes>
 </file>
 
-<file path=ppt/notesSlides/notesSlide19.xml><?xml version="1.0" encoding="utf-8"?>
+<file path=ppt/notesSlides/notesSlide21.xml><?xml version="1.0" encoding="utf-8"?>
 <p:notes xmlns:a="http://schemas.openxmlformats.org/drawingml/2006/main" xmlns:r="http://schemas.openxmlformats.org/officeDocument/2006/relationships" xmlns:p="http://schemas.openxmlformats.org/presentationml/2006/main" showMasterSp="0" showMasterPhAnim="0">
   <p:cSld>
     <p:spTree>
@@ -4977,123 +5631,7 @@
 </p:notes>
 </file>
 
-<file path=ppt/notesSlides/notesSlide2.xml><?xml version="1.0" encoding="utf-8"?>
-<p:notes xmlns:a="http://schemas.openxmlformats.org/drawingml/2006/main" xmlns:r="http://schemas.openxmlformats.org/officeDocument/2006/relationships" xmlns:p="http://schemas.openxmlformats.org/presentationml/2006/main" showMasterSp="0" showMasterPhAnim="0">
-  <p:cSld>
-    <p:spTree>
-      <p:nvGrpSpPr>
-        <p:cNvPr id="1" name="Shape 120"/>
-        <p:cNvGrpSpPr/>
-        <p:nvPr/>
-      </p:nvGrpSpPr>
-      <p:grpSpPr>
-        <a:xfrm>
-          <a:off x="0" y="0"/>
-          <a:ext cx="0" cy="0"/>
-          <a:chOff x="0" y="0"/>
-          <a:chExt cx="0" cy="0"/>
-        </a:xfrm>
-      </p:grpSpPr>
-      <p:sp>
-        <p:nvSpPr>
-          <p:cNvPr id="121" name="Shape 121"/>
-          <p:cNvSpPr txBox="1">
-            <a:spLocks noGrp="1"/>
-          </p:cNvSpPr>
-          <p:nvPr>
-            <p:ph type="body" idx="1"/>
-          </p:nvPr>
-        </p:nvSpPr>
-        <p:spPr>
-          <a:xfrm>
-            <a:off x="685800" y="4343400"/>
-            <a:ext cx="5486399" cy="4114800"/>
-          </a:xfrm>
-          <a:prstGeom prst="rect">
-            <a:avLst/>
-          </a:prstGeom>
-        </p:spPr>
-        <p:txBody>
-          <a:bodyPr lIns="91425" tIns="91425" rIns="91425" bIns="91425" anchor="ctr" anchorCtr="0">
-            <a:noAutofit/>
-          </a:bodyPr>
-          <a:lstStyle/>
-          <a:p>
-            <a:pPr>
-              <a:spcBef>
-                <a:spcPts val="0"/>
-              </a:spcBef>
-              <a:buNone/>
-            </a:pPr>
-            <a:endParaRPr/>
-          </a:p>
-        </p:txBody>
-      </p:sp>
-      <p:sp>
-        <p:nvSpPr>
-          <p:cNvPr id="122" name="Shape 122"/>
-          <p:cNvSpPr>
-            <a:spLocks noGrp="1" noRot="1" noChangeAspect="1"/>
-          </p:cNvSpPr>
-          <p:nvPr>
-            <p:ph type="sldImg" idx="2"/>
-          </p:nvPr>
-        </p:nvSpPr>
-        <p:spPr>
-          <a:xfrm>
-            <a:off x="381000" y="685800"/>
-            <a:ext cx="6096000" cy="3429000"/>
-          </a:xfrm>
-          <a:custGeom>
-            <a:avLst/>
-            <a:gdLst/>
-            <a:ahLst/>
-            <a:cxnLst/>
-            <a:rect l="0" t="0" r="0" b="0"/>
-            <a:pathLst>
-              <a:path w="120000" h="120000" extrusionOk="0">
-                <a:moveTo>
-                  <a:pt x="0" y="0"/>
-                </a:moveTo>
-                <a:lnTo>
-                  <a:pt x="120000" y="0"/>
-                </a:lnTo>
-                <a:lnTo>
-                  <a:pt x="120000" y="120000"/>
-                </a:lnTo>
-                <a:lnTo>
-                  <a:pt x="0" y="120000"/>
-                </a:lnTo>
-                <a:close/>
-              </a:path>
-            </a:pathLst>
-          </a:custGeom>
-          <a:noFill/>
-          <a:ln w="9525" cap="flat" cmpd="sng">
-            <a:solidFill>
-              <a:srgbClr val="000000"/>
-            </a:solidFill>
-            <a:prstDash val="solid"/>
-            <a:round/>
-            <a:headEnd type="none" w="med" len="med"/>
-            <a:tailEnd type="none" w="med" len="med"/>
-          </a:ln>
-        </p:spPr>
-      </p:sp>
-    </p:spTree>
-    <p:extLst>
-      <p:ext uri="{BB962C8B-B14F-4D97-AF65-F5344CB8AC3E}">
-        <p14:creationId xmlns:p14="http://schemas.microsoft.com/office/powerpoint/2010/main" val="3385273336"/>
-      </p:ext>
-    </p:extLst>
-  </p:cSld>
-  <p:clrMapOvr>
-    <a:masterClrMapping/>
-  </p:clrMapOvr>
-</p:notes>
-</file>
-
-<file path=ppt/notesSlides/notesSlide20.xml><?xml version="1.0" encoding="utf-8"?>
+<file path=ppt/notesSlides/notesSlide22.xml><?xml version="1.0" encoding="utf-8"?>
 <p:notes xmlns:a="http://schemas.openxmlformats.org/drawingml/2006/main" xmlns:r="http://schemas.openxmlformats.org/officeDocument/2006/relationships" xmlns:p="http://schemas.openxmlformats.org/presentationml/2006/main" showMasterSp="0" showMasterPhAnim="0">
   <p:cSld>
     <p:spTree>
@@ -5192,7 +5730,11 @@
               </a:spcBef>
               <a:buNone/>
             </a:pPr>
-            <a:endParaRPr/>
+            <a:r>
+              <a:rPr lang="en-GB" dirty="0" smtClean="0"/>
+              <a:t>Now .. to conclude,</a:t>
+            </a:r>
+            <a:endParaRPr dirty="0"/>
           </a:p>
         </p:txBody>
       </p:sp>
@@ -5209,7 +5751,7 @@
 </p:notes>
 </file>
 
-<file path=ppt/notesSlides/notesSlide21.xml><?xml version="1.0" encoding="utf-8"?>
+<file path=ppt/notesSlides/notesSlide23.xml><?xml version="1.0" encoding="utf-8"?>
 <p:notes xmlns:a="http://schemas.openxmlformats.org/drawingml/2006/main" xmlns:r="http://schemas.openxmlformats.org/officeDocument/2006/relationships" xmlns:p="http://schemas.openxmlformats.org/presentationml/2006/main" showMasterSp="0" showMasterPhAnim="0">
   <p:cSld>
     <p:spTree>
@@ -5308,7 +5850,79 @@
               </a:spcBef>
               <a:buNone/>
             </a:pPr>
-            <a:endParaRPr/>
+            <a:r>
+              <a:rPr lang="en-GB" smtClean="0"/>
+              <a:t>We </a:t>
+            </a:r>
+            <a:r>
+              <a:rPr lang="en-GB" baseline="0" dirty="0" smtClean="0"/>
+              <a:t>have a system that simulates an </a:t>
+            </a:r>
+            <a:r>
+              <a:rPr lang="en-GB" baseline="0" dirty="0" err="1" smtClean="0"/>
+              <a:t>IoT</a:t>
+            </a:r>
+            <a:r>
+              <a:rPr lang="en-GB" baseline="0" dirty="0" smtClean="0"/>
+              <a:t> environment</a:t>
+            </a:r>
+          </a:p>
+          <a:p>
+            <a:pPr>
+              <a:spcBef>
+                <a:spcPts val="0"/>
+              </a:spcBef>
+              <a:buNone/>
+            </a:pPr>
+            <a:r>
+              <a:rPr lang="en-GB" baseline="0" dirty="0" smtClean="0"/>
+              <a:t>Extracts and knowledge from raw data using statistical learning</a:t>
+            </a:r>
+          </a:p>
+          <a:p>
+            <a:pPr>
+              <a:spcBef>
+                <a:spcPts val="0"/>
+              </a:spcBef>
+              <a:buNone/>
+            </a:pPr>
+            <a:r>
+              <a:rPr lang="en-GB" baseline="0" dirty="0" smtClean="0"/>
+              <a:t>Evaluates how useful the new knowledge is.</a:t>
+            </a:r>
+          </a:p>
+          <a:p>
+            <a:pPr>
+              <a:spcBef>
+                <a:spcPts val="0"/>
+              </a:spcBef>
+              <a:buNone/>
+            </a:pPr>
+            <a:r>
+              <a:rPr lang="en-GB" baseline="0" dirty="0" smtClean="0"/>
+              <a:t>And only transmits it if it is useful.</a:t>
+            </a:r>
+          </a:p>
+          <a:p>
+            <a:pPr>
+              <a:spcBef>
+                <a:spcPts val="0"/>
+              </a:spcBef>
+              <a:buNone/>
+            </a:pPr>
+            <a:r>
+              <a:rPr lang="en-GB" baseline="0" dirty="0" smtClean="0"/>
+              <a:t>Intelligently quantizes the input space.. Based on distance, error, usage.</a:t>
+            </a:r>
+          </a:p>
+          <a:p>
+            <a:pPr>
+              <a:spcBef>
+                <a:spcPts val="0"/>
+              </a:spcBef>
+              <a:buNone/>
+            </a:pPr>
+            <a:endParaRPr dirty="0"/>
           </a:p>
         </p:txBody>
       </p:sp>
@@ -5424,7 +6038,88 @@
               </a:spcBef>
               <a:buNone/>
             </a:pPr>
-            <a:endParaRPr/>
+            <a:r>
+              <a:rPr lang="en-GB" dirty="0" smtClean="0"/>
+              <a:t>Well </a:t>
+            </a:r>
+            <a:r>
+              <a:rPr lang="en-GB" dirty="0" smtClean="0"/>
+              <a:t>…</a:t>
+            </a:r>
+            <a:endParaRPr lang="en-GB" dirty="0" smtClean="0"/>
+          </a:p>
+          <a:p>
+            <a:pPr>
+              <a:spcBef>
+                <a:spcPts val="0"/>
+              </a:spcBef>
+              <a:buNone/>
+            </a:pPr>
+            <a:r>
+              <a:rPr lang="en-GB" dirty="0" smtClean="0"/>
+              <a:t>The</a:t>
+            </a:r>
+            <a:r>
+              <a:rPr lang="en-GB" baseline="0" dirty="0" smtClean="0"/>
+              <a:t> idea is that everyday objects are connected to the internet</a:t>
+            </a:r>
+          </a:p>
+          <a:p>
+            <a:pPr>
+              <a:spcBef>
+                <a:spcPts val="0"/>
+              </a:spcBef>
+              <a:buNone/>
+            </a:pPr>
+            <a:r>
+              <a:rPr lang="en-GB" baseline="0" dirty="0" smtClean="0"/>
+              <a:t>This is only possible due to processing chips becoming smaller.</a:t>
+            </a:r>
+          </a:p>
+          <a:p>
+            <a:pPr>
+              <a:spcBef>
+                <a:spcPts val="0"/>
+              </a:spcBef>
+              <a:buNone/>
+            </a:pPr>
+            <a:r>
+              <a:rPr lang="en-GB" baseline="0" dirty="0" smtClean="0"/>
+              <a:t>This includes sensors capable of gathering information about their surroundings</a:t>
+            </a:r>
+          </a:p>
+          <a:p>
+            <a:pPr>
+              <a:spcBef>
+                <a:spcPts val="0"/>
+              </a:spcBef>
+              <a:buNone/>
+            </a:pPr>
+            <a:r>
+              <a:rPr lang="en-GB" baseline="0" dirty="0" smtClean="0"/>
+              <a:t>Such networks can be made up of a large amount of devices in different locations.</a:t>
+            </a:r>
+          </a:p>
+          <a:p>
+            <a:pPr>
+              <a:spcBef>
+                <a:spcPts val="0"/>
+              </a:spcBef>
+              <a:buNone/>
+            </a:pPr>
+            <a:r>
+              <a:rPr lang="en-GB" baseline="0" dirty="0" smtClean="0"/>
+              <a:t>Data is continuously read and transmitted to a central place/ concentrator</a:t>
+            </a:r>
+          </a:p>
+          <a:p>
+            <a:pPr>
+              <a:spcBef>
+                <a:spcPts val="0"/>
+              </a:spcBef>
+              <a:buNone/>
+            </a:pPr>
+            <a:endParaRPr dirty="0"/>
           </a:p>
         </p:txBody>
       </p:sp>
@@ -5489,7 +6184,15 @@
               </a:spcBef>
               <a:buNone/>
             </a:pPr>
-            <a:endParaRPr/>
+            <a:r>
+              <a:rPr lang="en-GB" dirty="0" smtClean="0"/>
+              <a:t>Let’s take a look at an</a:t>
+            </a:r>
+            <a:r>
+              <a:rPr lang="en-GB" baseline="0" dirty="0" smtClean="0"/>
+              <a:t> existing real life scenario</a:t>
+            </a:r>
+            <a:endParaRPr dirty="0"/>
           </a:p>
         </p:txBody>
       </p:sp>
@@ -5656,7 +6359,39 @@
               </a:spcBef>
               <a:buNone/>
             </a:pPr>
-            <a:endParaRPr/>
+            <a:r>
+              <a:rPr lang="en-GB" dirty="0" smtClean="0"/>
+              <a:t>These</a:t>
+            </a:r>
+            <a:r>
+              <a:rPr lang="en-GB" baseline="0" dirty="0" smtClean="0"/>
+              <a:t> are existing stations in different location across Beijing. </a:t>
+            </a:r>
+          </a:p>
+          <a:p>
+            <a:pPr>
+              <a:spcBef>
+                <a:spcPts val="0"/>
+              </a:spcBef>
+              <a:buNone/>
+            </a:pPr>
+            <a:r>
+              <a:rPr lang="en-GB" baseline="0" dirty="0" smtClean="0"/>
+              <a:t>They continuously gather data about the weather/ temperature/ pollutants / NO2</a:t>
+            </a:r>
+          </a:p>
+          <a:p>
+            <a:pPr>
+              <a:spcBef>
+                <a:spcPts val="0"/>
+              </a:spcBef>
+              <a:buNone/>
+            </a:pPr>
+            <a:r>
+              <a:rPr lang="en-GB" baseline="0" dirty="0" smtClean="0"/>
+              <a:t>In our evaluation we used the full data set made up of 36 sensors.</a:t>
+            </a:r>
+            <a:endParaRPr dirty="0"/>
           </a:p>
         </p:txBody>
       </p:sp>
@@ -5721,7 +6456,15 @@
               </a:spcBef>
               <a:buNone/>
             </a:pPr>
-            <a:endParaRPr/>
+            <a:r>
+              <a:rPr lang="en-GB" dirty="0" smtClean="0"/>
+              <a:t>So, what is</a:t>
+            </a:r>
+            <a:r>
+              <a:rPr lang="en-GB" baseline="0" dirty="0" smtClean="0"/>
+              <a:t> exactly the problem we are tackling</a:t>
+            </a:r>
+            <a:endParaRPr dirty="0"/>
           </a:p>
         </p:txBody>
       </p:sp>
@@ -5888,7 +6631,47 @@
               </a:spcBef>
               <a:buNone/>
             </a:pPr>
-            <a:endParaRPr/>
+            <a:r>
+              <a:rPr lang="en-GB" dirty="0" smtClean="0"/>
+              <a:t>Imagine thousands of sensors continuously</a:t>
+            </a:r>
+            <a:r>
+              <a:rPr lang="en-GB" baseline="0" dirty="0" smtClean="0"/>
+              <a:t> transmitting information about their environment.</a:t>
+            </a:r>
+          </a:p>
+          <a:p>
+            <a:pPr>
+              <a:spcBef>
+                <a:spcPts val="0"/>
+              </a:spcBef>
+              <a:buNone/>
+            </a:pPr>
+            <a:r>
+              <a:rPr lang="en-GB" baseline="0" dirty="0" smtClean="0"/>
+              <a:t>This leads to massive costs. Including; power costs, data transmission, storage</a:t>
+            </a:r>
+          </a:p>
+          <a:p>
+            <a:pPr>
+              <a:spcBef>
+                <a:spcPts val="0"/>
+              </a:spcBef>
+              <a:buNone/>
+            </a:pPr>
+            <a:r>
+              <a:rPr lang="en-GB" baseline="0" dirty="0" smtClean="0"/>
+              <a:t>Another issue is that the information transmitted needs to be accessible in real time from the concentrator.</a:t>
+            </a:r>
+          </a:p>
+          <a:p>
+            <a:pPr>
+              <a:spcBef>
+                <a:spcPts val="0"/>
+              </a:spcBef>
+              <a:buNone/>
+            </a:pPr>
+            <a:endParaRPr dirty="0"/>
           </a:p>
         </p:txBody>
       </p:sp>
@@ -5906,6 +6689,76 @@
 </file>
 
 <file path=ppt/notesSlides/notesSlide8.xml><?xml version="1.0" encoding="utf-8"?>
+<p:notes xmlns:a="http://schemas.openxmlformats.org/drawingml/2006/main" xmlns:r="http://schemas.openxmlformats.org/officeDocument/2006/relationships" xmlns:p="http://schemas.openxmlformats.org/presentationml/2006/main">
+  <p:cSld>
+    <p:spTree>
+      <p:nvGrpSpPr>
+        <p:cNvPr id="1" name=""/>
+        <p:cNvGrpSpPr/>
+        <p:nvPr/>
+      </p:nvGrpSpPr>
+      <p:grpSpPr>
+        <a:xfrm>
+          <a:off x="0" y="0"/>
+          <a:ext cx="0" cy="0"/>
+          <a:chOff x="0" y="0"/>
+          <a:chExt cx="0" cy="0"/>
+        </a:xfrm>
+      </p:grpSpPr>
+      <p:sp>
+        <p:nvSpPr>
+          <p:cNvPr id="2" name="Slide Image Placeholder 1"/>
+          <p:cNvSpPr>
+            <a:spLocks noGrp="1" noRot="1" noChangeAspect="1"/>
+          </p:cNvSpPr>
+          <p:nvPr>
+            <p:ph type="sldImg"/>
+          </p:nvPr>
+        </p:nvSpPr>
+        <p:spPr>
+          <a:xfrm>
+            <a:off x="381000" y="685800"/>
+            <a:ext cx="6096000" cy="3429000"/>
+          </a:xfrm>
+        </p:spPr>
+      </p:sp>
+      <p:sp>
+        <p:nvSpPr>
+          <p:cNvPr id="3" name="Notes Placeholder 2"/>
+          <p:cNvSpPr>
+            <a:spLocks noGrp="1"/>
+          </p:cNvSpPr>
+          <p:nvPr>
+            <p:ph type="body" idx="1"/>
+          </p:nvPr>
+        </p:nvSpPr>
+        <p:spPr/>
+        <p:txBody>
+          <a:bodyPr/>
+          <a:lstStyle/>
+          <a:p>
+            <a:r>
+              <a:rPr lang="en-GB" dirty="0" smtClean="0"/>
+              <a:t>Next, we will look at our aims.</a:t>
+            </a:r>
+            <a:endParaRPr lang="en-GB" dirty="0"/>
+          </a:p>
+        </p:txBody>
+      </p:sp>
+    </p:spTree>
+    <p:extLst>
+      <p:ext uri="{BB962C8B-B14F-4D97-AF65-F5344CB8AC3E}">
+        <p14:creationId xmlns:p14="http://schemas.microsoft.com/office/powerpoint/2010/main" val="2348388005"/>
+      </p:ext>
+    </p:extLst>
+  </p:cSld>
+  <p:clrMapOvr>
+    <a:masterClrMapping/>
+  </p:clrMapOvr>
+</p:notes>
+</file>
+
+<file path=ppt/notesSlides/notesSlide9.xml><?xml version="1.0" encoding="utf-8"?>
 <p:notes xmlns:a="http://schemas.openxmlformats.org/drawingml/2006/main" xmlns:r="http://schemas.openxmlformats.org/officeDocument/2006/relationships" xmlns:p="http://schemas.openxmlformats.org/presentationml/2006/main" showMasterSp="0" showMasterPhAnim="0">
   <p:cSld>
     <p:spTree>
@@ -5998,13 +6851,145 @@
           </a:bodyPr>
           <a:lstStyle/>
           <a:p>
+            <a:pPr marL="0" marR="0" lvl="0" indent="0" algn="l" defTabSz="914400" rtl="0" eaLnBrk="1" fontAlgn="auto" latinLnBrk="0" hangingPunct="1">
+              <a:lnSpc>
+                <a:spcPct val="100000"/>
+              </a:lnSpc>
+              <a:spcBef>
+                <a:spcPts val="0"/>
+              </a:spcBef>
+              <a:spcAft>
+                <a:spcPts val="0"/>
+              </a:spcAft>
+              <a:buClrTx/>
+              <a:buSzTx/>
+              <a:buFontTx/>
+              <a:buNone/>
+              <a:tabLst/>
+              <a:defRPr/>
+            </a:pPr>
+            <a:r>
+              <a:rPr lang="en-GB" dirty="0" smtClean="0"/>
+              <a:t>Develop </a:t>
+            </a:r>
+            <a:r>
+              <a:rPr lang="en-US" dirty="0" smtClean="0"/>
+              <a:t>a system capable of simulating an </a:t>
+            </a:r>
+            <a:r>
+              <a:rPr lang="en-US" dirty="0" err="1" smtClean="0"/>
+              <a:t>IoT</a:t>
+            </a:r>
+            <a:r>
+              <a:rPr lang="en-US" dirty="0" smtClean="0"/>
+              <a:t> environment.</a:t>
+            </a:r>
+          </a:p>
+          <a:p>
+            <a:pPr marL="0" marR="0" lvl="0" indent="0" algn="l" defTabSz="914400" rtl="0" eaLnBrk="1" fontAlgn="auto" latinLnBrk="0" hangingPunct="1">
+              <a:lnSpc>
+                <a:spcPct val="100000"/>
+              </a:lnSpc>
+              <a:spcBef>
+                <a:spcPts val="0"/>
+              </a:spcBef>
+              <a:spcAft>
+                <a:spcPts val="0"/>
+              </a:spcAft>
+              <a:buClrTx/>
+              <a:buSzTx/>
+              <a:buFontTx/>
+              <a:buNone/>
+              <a:tabLst/>
+              <a:defRPr/>
+            </a:pPr>
+            <a:r>
+              <a:rPr lang="en-US" dirty="0" smtClean="0"/>
+              <a:t>For each sensor, using statistical learning we want to extract knowledge from raw data</a:t>
+            </a:r>
+          </a:p>
+          <a:p>
+            <a:pPr marL="0" marR="0" lvl="0" indent="0" algn="l" defTabSz="914400" rtl="0" eaLnBrk="1" fontAlgn="auto" latinLnBrk="0" hangingPunct="1">
+              <a:lnSpc>
+                <a:spcPct val="100000"/>
+              </a:lnSpc>
+              <a:spcBef>
+                <a:spcPts val="0"/>
+              </a:spcBef>
+              <a:spcAft>
+                <a:spcPts val="0"/>
+              </a:spcAft>
+              <a:buClrTx/>
+              <a:buSzTx/>
+              <a:buFontTx/>
+              <a:buNone/>
+              <a:tabLst/>
+              <a:defRPr/>
+            </a:pPr>
+            <a:r>
+              <a:rPr lang="en-US" dirty="0" smtClean="0"/>
+              <a:t>Using this knowledge we want to improve network efficiency.</a:t>
+            </a:r>
+          </a:p>
+          <a:p>
+            <a:pPr marL="0" marR="0" lvl="0" indent="0" algn="l" defTabSz="914400" rtl="0" eaLnBrk="1" fontAlgn="auto" latinLnBrk="0" hangingPunct="1">
+              <a:lnSpc>
+                <a:spcPct val="100000"/>
+              </a:lnSpc>
+              <a:spcBef>
+                <a:spcPts val="0"/>
+              </a:spcBef>
+              <a:spcAft>
+                <a:spcPts val="0"/>
+              </a:spcAft>
+              <a:buClrTx/>
+              <a:buSzTx/>
+              <a:buFontTx/>
+              <a:buNone/>
+              <a:tabLst/>
+              <a:defRPr/>
+            </a:pPr>
+            <a:r>
+              <a:rPr lang="en-US" dirty="0" smtClean="0"/>
+              <a:t>Using</a:t>
+            </a:r>
+            <a:r>
+              <a:rPr lang="en-US" baseline="0" dirty="0" smtClean="0"/>
+              <a:t> ensemble learning we would like to minimize the error at the concentrator</a:t>
+            </a:r>
+          </a:p>
+          <a:p>
+            <a:pPr marL="0" marR="0" lvl="0" indent="0" algn="l" defTabSz="914400" rtl="0" eaLnBrk="1" fontAlgn="auto" latinLnBrk="0" hangingPunct="1">
+              <a:lnSpc>
+                <a:spcPct val="100000"/>
+              </a:lnSpc>
+              <a:spcBef>
+                <a:spcPts val="0"/>
+              </a:spcBef>
+              <a:spcAft>
+                <a:spcPts val="0"/>
+              </a:spcAft>
+              <a:buClrTx/>
+              <a:buSzTx/>
+              <a:buFontTx/>
+              <a:buNone/>
+              <a:tabLst/>
+              <a:defRPr/>
+            </a:pPr>
+            <a:r>
+              <a:rPr lang="en-US" baseline="0" dirty="0" smtClean="0"/>
+              <a:t>Compare the naïve system and our system.</a:t>
+            </a:r>
+            <a:endParaRPr lang="en-US" dirty="0" smtClean="0"/>
+          </a:p>
+          <a:p>
             <a:pPr>
               <a:spcBef>
                 <a:spcPts val="0"/>
               </a:spcBef>
               <a:buNone/>
             </a:pPr>
-            <a:endParaRPr/>
+            <a:endParaRPr dirty="0"/>
           </a:p>
         </p:txBody>
       </p:sp>
@@ -6012,122 +6997,6 @@
     <p:extLst>
       <p:ext uri="{BB962C8B-B14F-4D97-AF65-F5344CB8AC3E}">
         <p14:creationId xmlns:p14="http://schemas.microsoft.com/office/powerpoint/2010/main" val="3845801522"/>
-      </p:ext>
-    </p:extLst>
-  </p:cSld>
-  <p:clrMapOvr>
-    <a:masterClrMapping/>
-  </p:clrMapOvr>
-</p:notes>
-</file>
-
-<file path=ppt/notesSlides/notesSlide9.xml><?xml version="1.0" encoding="utf-8"?>
-<p:notes xmlns:a="http://schemas.openxmlformats.org/drawingml/2006/main" xmlns:r="http://schemas.openxmlformats.org/officeDocument/2006/relationships" xmlns:p="http://schemas.openxmlformats.org/presentationml/2006/main" showMasterSp="0" showMasterPhAnim="0">
-  <p:cSld>
-    <p:spTree>
-      <p:nvGrpSpPr>
-        <p:cNvPr id="1" name="Shape 137"/>
-        <p:cNvGrpSpPr/>
-        <p:nvPr/>
-      </p:nvGrpSpPr>
-      <p:grpSpPr>
-        <a:xfrm>
-          <a:off x="0" y="0"/>
-          <a:ext cx="0" cy="0"/>
-          <a:chOff x="0" y="0"/>
-          <a:chExt cx="0" cy="0"/>
-        </a:xfrm>
-      </p:grpSpPr>
-      <p:sp>
-        <p:nvSpPr>
-          <p:cNvPr id="138" name="Shape 138"/>
-          <p:cNvSpPr>
-            <a:spLocks noGrp="1" noRot="1" noChangeAspect="1"/>
-          </p:cNvSpPr>
-          <p:nvPr>
-            <p:ph type="sldImg" idx="2"/>
-          </p:nvPr>
-        </p:nvSpPr>
-        <p:spPr>
-          <a:xfrm>
-            <a:off x="381000" y="685800"/>
-            <a:ext cx="6096000" cy="3429000"/>
-          </a:xfrm>
-          <a:custGeom>
-            <a:avLst/>
-            <a:gdLst/>
-            <a:ahLst/>
-            <a:cxnLst/>
-            <a:rect l="0" t="0" r="0" b="0"/>
-            <a:pathLst>
-              <a:path w="120000" h="120000" extrusionOk="0">
-                <a:moveTo>
-                  <a:pt x="0" y="0"/>
-                </a:moveTo>
-                <a:lnTo>
-                  <a:pt x="120000" y="0"/>
-                </a:lnTo>
-                <a:lnTo>
-                  <a:pt x="120000" y="120000"/>
-                </a:lnTo>
-                <a:lnTo>
-                  <a:pt x="0" y="120000"/>
-                </a:lnTo>
-                <a:close/>
-              </a:path>
-            </a:pathLst>
-          </a:custGeom>
-          <a:noFill/>
-          <a:ln w="9525" cap="flat" cmpd="sng">
-            <a:solidFill>
-              <a:srgbClr val="000000"/>
-            </a:solidFill>
-            <a:prstDash val="solid"/>
-            <a:round/>
-            <a:headEnd type="none" w="med" len="med"/>
-            <a:tailEnd type="none" w="med" len="med"/>
-          </a:ln>
-        </p:spPr>
-      </p:sp>
-      <p:sp>
-        <p:nvSpPr>
-          <p:cNvPr id="139" name="Shape 139"/>
-          <p:cNvSpPr txBox="1">
-            <a:spLocks noGrp="1"/>
-          </p:cNvSpPr>
-          <p:nvPr>
-            <p:ph type="body" idx="1"/>
-          </p:nvPr>
-        </p:nvSpPr>
-        <p:spPr>
-          <a:xfrm>
-            <a:off x="685800" y="4343400"/>
-            <a:ext cx="5486399" cy="4114800"/>
-          </a:xfrm>
-          <a:prstGeom prst="rect">
-            <a:avLst/>
-          </a:prstGeom>
-        </p:spPr>
-        <p:txBody>
-          <a:bodyPr lIns="91425" tIns="91425" rIns="91425" bIns="91425" anchor="t" anchorCtr="0">
-            <a:noAutofit/>
-          </a:bodyPr>
-          <a:lstStyle/>
-          <a:p>
-            <a:pPr lvl="0" rtl="0">
-              <a:spcBef>
-                <a:spcPts val="0"/>
-              </a:spcBef>
-              <a:buNone/>
-            </a:pPr>
-            <a:endParaRPr/>
-          </a:p>
-        </p:txBody>
-      </p:sp>
-    </p:spTree>
-    <p:extLst>
-      <p:ext uri="{BB962C8B-B14F-4D97-AF65-F5344CB8AC3E}">
-        <p14:creationId xmlns:p14="http://schemas.microsoft.com/office/powerpoint/2010/main" val="3570477444"/>
       </p:ext>
     </p:extLst>
   </p:cSld>
@@ -17083,7 +17952,7 @@
           <p:nvPr/>
         </p:nvPicPr>
         <p:blipFill rotWithShape="1">
-          <a:blip r:embed="rId3">
+          <a:blip r:embed="rId5">
             <a:alphaModFix/>
           </a:blip>
           <a:srcRect/>
@@ -17110,7 +17979,7 @@
           <p:nvPr/>
         </p:nvPicPr>
         <p:blipFill rotWithShape="1">
-          <a:blip r:embed="rId4">
+          <a:blip r:embed="rId6">
             <a:alphaModFix/>
           </a:blip>
           <a:srcRect/>
@@ -17442,7 +18311,7 @@
           <p:nvPr/>
         </p:nvPicPr>
         <p:blipFill rotWithShape="1">
-          <a:blip r:embed="rId5">
+          <a:blip r:embed="rId7">
             <a:alphaModFix/>
           </a:blip>
           <a:srcRect/>
@@ -17462,18 +18331,131 @@
           </a:ln>
         </p:spPr>
       </p:pic>
+      <p:pic>
+        <p:nvPicPr>
+          <p:cNvPr id="7" name="Audio 6">
+            <a:hlinkClick r:id="" action="ppaction://media"/>
+          </p:cNvPr>
+          <p:cNvPicPr>
+            <a:picLocks noChangeAspect="1"/>
+          </p:cNvPicPr>
+          <p:nvPr>
+            <a:audioFile r:link="rId2"/>
+            <p:extLst>
+              <p:ext uri="{DAA4B4D4-6D71-4841-9C94-3DE7FCFB9230}">
+                <p14:media xmlns:p14="http://schemas.microsoft.com/office/powerpoint/2010/main" r:embed="rId1"/>
+              </p:ext>
+            </p:extLst>
+          </p:nvPr>
+        </p:nvPicPr>
+        <p:blipFill>
+          <a:blip r:embed="rId8"/>
+          <a:stretch>
+            <a:fillRect/>
+          </a:stretch>
+        </p:blipFill>
+        <p:spPr>
+          <a:xfrm>
+            <a:off x="8440738" y="4440238"/>
+            <a:ext cx="487362" cy="487362"/>
+          </a:xfrm>
+          <a:prstGeom prst="rect">
+            <a:avLst/>
+          </a:prstGeom>
+        </p:spPr>
+      </p:pic>
     </p:spTree>
   </p:cSld>
   <p:clrMapOvr>
     <a:masterClrMapping/>
   </p:clrMapOvr>
-  <p:transition spd="slow">
+  <p:transition spd="slow" advTm="10435">
     <p:cut/>
   </p:transition>
   <p:timing>
     <p:tnLst>
       <p:par>
-        <p:cTn id="1" dur="indefinite" restart="never" nodeType="tmRoot"/>
+        <p:cTn id="1" dur="indefinite" restart="never" nodeType="tmRoot">
+          <p:childTnLst>
+            <p:seq concurrent="1" nextAc="seek">
+              <p:cTn id="2" dur="indefinite" nodeType="mainSeq">
+                <p:childTnLst>
+                  <p:par>
+                    <p:cTn id="3" fill="hold">
+                      <p:stCondLst>
+                        <p:cond delay="indefinite"/>
+                        <p:cond evt="onBegin" delay="0">
+                          <p:tn val="2"/>
+                        </p:cond>
+                      </p:stCondLst>
+                      <p:childTnLst>
+                        <p:par>
+                          <p:cTn id="4" fill="hold">
+                            <p:stCondLst>
+                              <p:cond delay="0"/>
+                            </p:stCondLst>
+                            <p:childTnLst>
+                              <p:par>
+                                <p:cTn id="5" presetID="1" presetClass="mediacall" presetSubtype="0" fill="hold" nodeType="afterEffect">
+                                  <p:stCondLst>
+                                    <p:cond delay="0"/>
+                                  </p:stCondLst>
+                                  <p:childTnLst>
+                                    <p:cmd type="call" cmd="playFrom(0.0)">
+                                      <p:cBhvr>
+                                        <p:cTn id="6" dur="1" fill="hold"/>
+                                        <p:tgtEl>
+                                          <p:spTgt spid="7"/>
+                                        </p:tgtEl>
+                                      </p:cBhvr>
+                                    </p:cmd>
+                                  </p:childTnLst>
+                                </p:cTn>
+                              </p:par>
+                            </p:childTnLst>
+                          </p:cTn>
+                        </p:par>
+                      </p:childTnLst>
+                    </p:cTn>
+                  </p:par>
+                </p:childTnLst>
+              </p:cTn>
+              <p:prevCondLst>
+                <p:cond evt="onPrev" delay="0">
+                  <p:tgtEl>
+                    <p:sldTgt/>
+                  </p:tgtEl>
+                </p:cond>
+              </p:prevCondLst>
+              <p:nextCondLst>
+                <p:cond evt="onNext" delay="0">
+                  <p:tgtEl>
+                    <p:sldTgt/>
+                  </p:tgtEl>
+                </p:cond>
+              </p:nextCondLst>
+            </p:seq>
+            <p:audio isNarration="1">
+              <p:cMediaNode vol="100000" showWhenStopped="0">
+                <p:cTn id="7" fill="hold" display="0">
+                  <p:stCondLst>
+                    <p:cond delay="indefinite"/>
+                  </p:stCondLst>
+                  <p:endCondLst>
+                    <p:cond evt="onStopAudio" delay="0">
+                      <p:tgtEl>
+                        <p:sldTgt/>
+                      </p:tgtEl>
+                    </p:cond>
+                  </p:endCondLst>
+                </p:cTn>
+                <p:tgtEl>
+                  <p:spTgt spid="7"/>
+                </p:tgtEl>
+              </p:cMediaNode>
+            </p:audio>
+          </p:childTnLst>
+        </p:cTn>
       </p:par>
     </p:tnLst>
   </p:timing>
@@ -18172,7 +19154,6 @@
               <a:rPr lang="en-US" dirty="0"/>
               <a:t>data representatives</a:t>
             </a:r>
-            <a:endParaRPr lang="en-US" dirty="0"/>
           </a:p>
         </p:txBody>
       </p:sp>
@@ -18302,25 +19283,6 @@
             <a:noAutofit/>
           </a:bodyPr>
           <a:lstStyle/>
-          <a:p>
-            <a:pPr marL="457200" lvl="0" indent="-228600" rtl="0">
-              <a:spcBef>
-                <a:spcPts val="0"/>
-              </a:spcBef>
-            </a:pPr>
-            <a:r>
-              <a:rPr lang="en-US" dirty="0" smtClean="0"/>
-              <a:t>Data representatives consider </a:t>
-            </a:r>
-            <a:r>
-              <a:rPr lang="en-US" i="1" dirty="0" smtClean="0"/>
-              <a:t>distance</a:t>
-            </a:r>
-            <a:r>
-              <a:rPr lang="en-US" dirty="0" smtClean="0"/>
-              <a:t> only</a:t>
-            </a:r>
-          </a:p>
           <a:p>
             <a:pPr marL="457200" lvl="0" indent="-228600" rtl="0">
               <a:spcBef>
@@ -18594,11 +19556,7 @@
             </a:pPr>
             <a:r>
               <a:rPr lang="en-US" dirty="0" smtClean="0"/>
-              <a:t>Query accuracy</a:t>
-            </a:r>
-            <a:r>
-              <a:rPr lang="en-US" dirty="0" smtClean="0"/>
-              <a:t> </a:t>
+              <a:t>Query accuracy </a:t>
             </a:r>
             <a:endParaRPr lang="en-US" dirty="0"/>
           </a:p>
@@ -19122,6 +20080,39 @@
           </a:p>
         </p:txBody>
       </p:sp>
+      <p:pic>
+        <p:nvPicPr>
+          <p:cNvPr id="5" name="Audio 4">
+            <a:hlinkClick r:id="" action="ppaction://media"/>
+          </p:cNvPr>
+          <p:cNvPicPr>
+            <a:picLocks noChangeAspect="1"/>
+          </p:cNvPicPr>
+          <p:nvPr>
+            <a:audioFile r:link="rId2"/>
+            <p:extLst>
+              <p:ext uri="{DAA4B4D4-6D71-4841-9C94-3DE7FCFB9230}">
+                <p14:media xmlns:p14="http://schemas.microsoft.com/office/powerpoint/2010/main" r:embed="rId1"/>
+              </p:ext>
+            </p:extLst>
+          </p:nvPr>
+        </p:nvPicPr>
+        <p:blipFill>
+          <a:blip r:embed="rId5"/>
+          <a:stretch>
+            <a:fillRect/>
+          </a:stretch>
+        </p:blipFill>
+        <p:spPr>
+          <a:xfrm>
+            <a:off x="8440738" y="4440238"/>
+            <a:ext cx="487362" cy="487362"/>
+          </a:xfrm>
+          <a:prstGeom prst="rect">
+            <a:avLst/>
+          </a:prstGeom>
+        </p:spPr>
+      </p:pic>
     </p:spTree>
     <p:extLst>
       <p:ext uri="{BB962C8B-B14F-4D97-AF65-F5344CB8AC3E}">
@@ -19132,13 +20123,93 @@
   <p:clrMapOvr>
     <a:masterClrMapping/>
   </p:clrMapOvr>
-  <p:transition spd="slow">
+  <p:transition spd="slow" advTm="3854">
     <p:cut/>
   </p:transition>
   <p:timing>
     <p:tnLst>
       <p:par>
-        <p:cTn id="1" dur="indefinite" restart="never" nodeType="tmRoot"/>
+        <p:cTn id="1" dur="indefinite" restart="never" nodeType="tmRoot">
+          <p:childTnLst>
+            <p:seq concurrent="1" nextAc="seek">
+              <p:cTn id="2" dur="indefinite" nodeType="mainSeq">
+                <p:childTnLst>
+                  <p:par>
+                    <p:cTn id="3" fill="hold">
+                      <p:stCondLst>
+                        <p:cond delay="indefinite"/>
+                        <p:cond evt="onBegin" delay="0">
+                          <p:tn val="2"/>
+                        </p:cond>
+                      </p:stCondLst>
+                      <p:childTnLst>
+                        <p:par>
+                          <p:cTn id="4" fill="hold">
+                            <p:stCondLst>
+                              <p:cond delay="0"/>
+                            </p:stCondLst>
+                            <p:childTnLst>
+                              <p:par>
+                                <p:cTn id="5" presetID="1" presetClass="mediacall" presetSubtype="0" fill="hold" nodeType="afterEffect">
+                                  <p:stCondLst>
+                                    <p:cond delay="0"/>
+                                  </p:stCondLst>
+                                  <p:childTnLst>
+                                    <p:cmd type="call" cmd="playFrom(0.0)">
+                                      <p:cBhvr>
+                                        <p:cTn id="6" dur="1" fill="hold"/>
+                                        <p:tgtEl>
+                                          <p:spTgt spid="5"/>
+                                        </p:tgtEl>
+                                      </p:cBhvr>
+                                    </p:cmd>
+                                  </p:childTnLst>
+                                </p:cTn>
+                              </p:par>
+                            </p:childTnLst>
+                          </p:cTn>
+                        </p:par>
+                      </p:childTnLst>
+                    </p:cTn>
+                  </p:par>
+                </p:childTnLst>
+              </p:cTn>
+              <p:prevCondLst>
+                <p:cond evt="onPrev" delay="0">
+                  <p:tgtEl>
+                    <p:sldTgt/>
+                  </p:tgtEl>
+                </p:cond>
+              </p:prevCondLst>
+              <p:nextCondLst>
+                <p:cond evt="onNext" delay="0">
+                  <p:tgtEl>
+                    <p:sldTgt/>
+                  </p:tgtEl>
+                </p:cond>
+              </p:nextCondLst>
+            </p:seq>
+            <p:audio isNarration="1">
+              <p:cMediaNode vol="80000" showWhenStopped="0">
+                <p:cTn id="7" fill="hold" display="0">
+                  <p:stCondLst>
+                    <p:cond delay="indefinite"/>
+                  </p:stCondLst>
+                  <p:endCondLst>
+                    <p:cond evt="onStopAudio" delay="0">
+                      <p:tgtEl>
+                        <p:sldTgt/>
+                      </p:tgtEl>
+                    </p:cond>
+                  </p:endCondLst>
+                </p:cTn>
+                <p:tgtEl>
+                  <p:spTgt spid="5"/>
+                </p:tgtEl>
+              </p:cMediaNode>
+            </p:audio>
+          </p:childTnLst>
+        </p:cTn>
       </p:par>
     </p:tnLst>
   </p:timing>
@@ -19644,7 +20715,7 @@
           <p:nvPr/>
         </p:nvPicPr>
         <p:blipFill>
-          <a:blip r:embed="rId3" cstate="print">
+          <a:blip r:embed="rId5" cstate="print">
             <a:extLst>
               <a:ext uri="{28A0092B-C50C-407E-A947-70E740481C1C}">
                 <a14:useLocalDpi xmlns:a14="http://schemas.microsoft.com/office/drawing/2010/main" val="0"/>
@@ -19712,11 +20783,7 @@
             </a:pPr>
             <a:r>
               <a:rPr lang="en-US" dirty="0" smtClean="0"/>
-              <a:t>Small </a:t>
-            </a:r>
-            <a:r>
-              <a:rPr lang="en-US" dirty="0" smtClean="0"/>
-              <a:t>chips/sensors</a:t>
+              <a:t>Small chips/sensors</a:t>
             </a:r>
           </a:p>
           <a:p>
@@ -19731,7 +20798,6 @@
               <a:rPr lang="en-US" dirty="0" smtClean="0"/>
               <a:t>Computational capabilities</a:t>
             </a:r>
-            <a:endParaRPr lang="en-US" dirty="0" smtClean="0"/>
           </a:p>
           <a:p>
             <a:pPr marL="571500" lvl="0" indent="-342900" rtl="0">
@@ -19762,6 +20828,39 @@
           </a:p>
         </p:txBody>
       </p:sp>
+      <p:pic>
+        <p:nvPicPr>
+          <p:cNvPr id="7" name="Audio 6">
+            <a:hlinkClick r:id="" action="ppaction://media"/>
+          </p:cNvPr>
+          <p:cNvPicPr>
+            <a:picLocks noChangeAspect="1"/>
+          </p:cNvPicPr>
+          <p:nvPr>
+            <a:audioFile r:link="rId2"/>
+            <p:extLst>
+              <p:ext uri="{DAA4B4D4-6D71-4841-9C94-3DE7FCFB9230}">
+                <p14:media xmlns:p14="http://schemas.microsoft.com/office/powerpoint/2010/main" r:embed="rId1"/>
+              </p:ext>
+            </p:extLst>
+          </p:nvPr>
+        </p:nvPicPr>
+        <p:blipFill>
+          <a:blip r:embed="rId6"/>
+          <a:stretch>
+            <a:fillRect/>
+          </a:stretch>
+        </p:blipFill>
+        <p:spPr>
+          <a:xfrm>
+            <a:off x="8440738" y="4440238"/>
+            <a:ext cx="487362" cy="487362"/>
+          </a:xfrm>
+          <a:prstGeom prst="rect">
+            <a:avLst/>
+          </a:prstGeom>
+        </p:spPr>
+      </p:pic>
     </p:spTree>
     <p:extLst>
       <p:ext uri="{BB962C8B-B14F-4D97-AF65-F5344CB8AC3E}">
@@ -19772,13 +20871,93 @@
   <p:clrMapOvr>
     <a:masterClrMapping/>
   </p:clrMapOvr>
-  <p:transition spd="slow">
+  <p:transition spd="slow" advTm="3759">
     <p:cut/>
   </p:transition>
   <p:timing>
     <p:tnLst>
       <p:par>
-        <p:cTn id="1" dur="indefinite" restart="never" nodeType="tmRoot"/>
+        <p:cTn id="1" dur="indefinite" restart="never" nodeType="tmRoot">
+          <p:childTnLst>
+            <p:seq concurrent="1" nextAc="seek">
+              <p:cTn id="2" dur="indefinite" nodeType="mainSeq">
+                <p:childTnLst>
+                  <p:par>
+                    <p:cTn id="3" fill="hold">
+                      <p:stCondLst>
+                        <p:cond delay="indefinite"/>
+                        <p:cond evt="onBegin" delay="0">
+                          <p:tn val="2"/>
+                        </p:cond>
+                      </p:stCondLst>
+                      <p:childTnLst>
+                        <p:par>
+                          <p:cTn id="4" fill="hold">
+                            <p:stCondLst>
+                              <p:cond delay="0"/>
+                            </p:stCondLst>
+                            <p:childTnLst>
+                              <p:par>
+                                <p:cTn id="5" presetID="1" presetClass="mediacall" presetSubtype="0" fill="hold" nodeType="afterEffect">
+                                  <p:stCondLst>
+                                    <p:cond delay="0"/>
+                                  </p:stCondLst>
+                                  <p:childTnLst>
+                                    <p:cmd type="call" cmd="playFrom(0.0)">
+                                      <p:cBhvr>
+                                        <p:cTn id="6" dur="1" fill="hold"/>
+                                        <p:tgtEl>
+                                          <p:spTgt spid="7"/>
+                                        </p:tgtEl>
+                                      </p:cBhvr>
+                                    </p:cmd>
+                                  </p:childTnLst>
+                                </p:cTn>
+                              </p:par>
+                            </p:childTnLst>
+                          </p:cTn>
+                        </p:par>
+                      </p:childTnLst>
+                    </p:cTn>
+                  </p:par>
+                </p:childTnLst>
+              </p:cTn>
+              <p:prevCondLst>
+                <p:cond evt="onPrev" delay="0">
+                  <p:tgtEl>
+                    <p:sldTgt/>
+                  </p:tgtEl>
+                </p:cond>
+              </p:prevCondLst>
+              <p:nextCondLst>
+                <p:cond evt="onNext" delay="0">
+                  <p:tgtEl>
+                    <p:sldTgt/>
+                  </p:tgtEl>
+                </p:cond>
+              </p:nextCondLst>
+            </p:seq>
+            <p:audio isNarration="1">
+              <p:cMediaNode vol="80000" showWhenStopped="0">
+                <p:cTn id="7" fill="hold" display="0">
+                  <p:stCondLst>
+                    <p:cond delay="indefinite"/>
+                  </p:stCondLst>
+                  <p:endCondLst>
+                    <p:cond evt="onStopAudio" delay="0">
+                      <p:tgtEl>
+                        <p:sldTgt/>
+                      </p:tgtEl>
+                    </p:cond>
+                  </p:endCondLst>
+                </p:cTn>
+                <p:tgtEl>
+                  <p:spTgt spid="7"/>
+                </p:tgtEl>
+              </p:cMediaNode>
+            </p:audio>
+          </p:childTnLst>
+        </p:cTn>
       </p:par>
     </p:tnLst>
   </p:timing>
@@ -20339,6 +21518,13 @@
   <p:clrMapOvr>
     <a:masterClrMapping/>
   </p:clrMapOvr>
+  <p:timing>
+    <p:tnLst>
+      <p:par>
+        <p:cTn id="1" dur="indefinite" restart="never" nodeType="tmRoot"/>
+      </p:par>
+    </p:tnLst>
+  </p:timing>
 </p:sld>
 </file>
 
@@ -20467,7 +21653,17 @@
             </a:pPr>
             <a:r>
               <a:rPr lang="en-US" dirty="0" smtClean="0"/>
-              <a:t>Evaluate the query performance</a:t>
+              <a:t>Using ensemble learning, minimize the error at the concentrator.</a:t>
+            </a:r>
+          </a:p>
+          <a:p>
+            <a:pPr marL="571500" lvl="1" indent="-342900">
+              <a:buFont typeface="Arial" panose="020B0604020202020204" pitchFamily="34" charset="0"/>
+              <a:buChar char="•"/>
+            </a:pPr>
+            <a:r>
+              <a:rPr lang="en-US" dirty="0" smtClean="0"/>
+              <a:t>Evaluate the query performance of the naïve approach and our system.</a:t>
             </a:r>
           </a:p>
         </p:txBody>

</xml_diff>